<commit_message>
Small modifications to The Time Plan
</commit_message>
<xml_diff>
--- a/Discussions/Midyear_Discussion/presentation.pptx
+++ b/Discussions/Midyear_Discussion/presentation.pptx
@@ -27251,8 +27251,8 @@
         </p:nvSpPr>
         <p:spPr>
           <a:xfrm>
-            <a:off x="3741433" y="3110802"/>
-            <a:ext cx="1460500" cy="170519"/>
+            <a:off x="3741432" y="3111423"/>
+            <a:ext cx="1727199" cy="169277"/>
           </a:xfrm>
           <a:prstGeom prst="rect">
             <a:avLst/>
@@ -27266,13 +27266,13 @@
           <a:lstStyle/>
           <a:p>
             <a:r>
-              <a:rPr lang="en-GB" sz="1100" b="1" spc="-4">
+              <a:rPr lang="en-GB" sz="1100" b="1" spc="-4" dirty="0">
                 <a:solidFill>
                   <a:schemeClr val="dk1"/>
                 </a:solidFill>
                 <a:latin typeface="Calibri" panose="020F0502020204030204" pitchFamily="34" charset="0"/>
               </a:rPr>
-              <a:t>Construct Class Diagrams</a:t>
+              <a:t>Construct Sequence Diagrams</a:t>
             </a:r>
           </a:p>
         </p:txBody>
@@ -27399,13 +27399,13 @@
           <a:lstStyle/>
           <a:p>
             <a:r>
-              <a:rPr lang="en-GB" sz="1100" b="1" spc="-4">
+              <a:rPr lang="en-GB" sz="1100" b="1" spc="-4" dirty="0">
                 <a:solidFill>
                   <a:schemeClr val="dk1"/>
                 </a:solidFill>
                 <a:latin typeface="Calibri" panose="020F0502020204030204" pitchFamily="34" charset="0"/>
               </a:rPr>
-              <a:t>Construct Sequence Diagrams</a:t>
+              <a:t>Construct Class Diagrams</a:t>
             </a:r>
           </a:p>
         </p:txBody>
@@ -27443,7 +27443,7 @@
           <a:lstStyle/>
           <a:p>
             <a:r>
-              <a:rPr lang="en-GB" sz="1000" spc="-10">
+              <a:rPr lang="en-GB" sz="1000" spc="-10" dirty="0">
                 <a:solidFill>
                   <a:srgbClr val="EEECE1"/>
                 </a:solidFill>
@@ -28820,30 +28820,30 @@
           <a:lstStyle/>
           <a:p>
             <a:r>
-              <a:rPr lang="en-GB" sz="2000"/>
+              <a:rPr lang="en-GB" sz="2000" dirty="0"/>
               <a:t>As you can see from the system specifications, we manged to capture the system requirements and dividing the system into parts.</a:t>
             </a:r>
           </a:p>
           <a:p>
-            <a:endParaRPr lang="en-GB" sz="2000"/>
+            <a:endParaRPr lang="en-GB" sz="2000" dirty="0"/>
           </a:p>
           <a:p>
             <a:r>
-              <a:rPr lang="en-GB" sz="2000"/>
+              <a:rPr lang="en-GB" sz="2000" dirty="0"/>
               <a:t>Now we are in the designing step, we will use Agile SDLC so we implementing the system in manageable incremental steps instead of one big step.</a:t>
             </a:r>
           </a:p>
           <a:p>
-            <a:endParaRPr lang="en-GB" sz="2000"/>
+            <a:endParaRPr lang="en-GB" sz="2000" dirty="0"/>
           </a:p>
           <a:p>
             <a:r>
-              <a:rPr lang="en-GB" sz="2000"/>
+              <a:rPr lang="en-GB" sz="2000" dirty="0"/>
               <a:t>The first agile cycle will include Student/Instructor Registration and Account Management.</a:t>
             </a:r>
           </a:p>
           <a:p>
-            <a:endParaRPr lang="en-GB" sz="2000"/>
+            <a:endParaRPr lang="en-GB" sz="2000" dirty="0"/>
           </a:p>
         </p:txBody>
       </p:sp>

</xml_diff>

<commit_message>
Update Deliver Assignment Sequence Diagram
</commit_message>
<xml_diff>
--- a/Discussions/Midyear_Discussion/presentation.pptx
+++ b/Discussions/Midyear_Discussion/presentation.pptx
@@ -28809,8 +28809,8 @@
         </p:nvSpPr>
         <p:spPr>
           <a:xfrm>
-            <a:off x="1137035" y="2194102"/>
-            <a:ext cx="6516216" cy="3908585"/>
+            <a:off x="1137035" y="1932486"/>
+            <a:ext cx="6516216" cy="4722837"/>
           </a:xfrm>
         </p:spPr>
         <p:txBody>
@@ -28831,6 +28831,15 @@
             <a:r>
               <a:rPr lang="en-GB" sz="2000" dirty="0"/>
               <a:t>Now we are in the designing step, we will use Agile SDLC so we implementing the system in manageable incremental steps instead of one big step.</a:t>
+            </a:r>
+          </a:p>
+          <a:p>
+            <a:endParaRPr lang="en-GB" sz="2000" dirty="0"/>
+          </a:p>
+          <a:p>
+            <a:r>
+              <a:rPr lang="en-GB" sz="2000" dirty="0"/>
+              <a:t>Second reason to use Agile is to not overpromise features and fail on delivery.</a:t>
             </a:r>
           </a:p>
           <a:p>
@@ -28890,7 +28899,7 @@
           <p:cNvPr id="30" name="Rectangle 29">
             <a:extLst>
               <a:ext uri="{FF2B5EF4-FFF2-40B4-BE49-F238E27FC236}">
-                <a16:creationId xmlns:a16="http://schemas.microsoft.com/office/drawing/2014/main" id="{8D1AA55E-40D5-461B-A5A8-4AE8AAB71B08}"/>
+                <a16:creationId xmlns:a16="http://schemas.microsoft.com/office/drawing/2014/main" id="{5D13CC36-B950-4F02-9BAF-9A7EB267398C}"/>
               </a:ext>
               <a:ext uri="{C183D7F6-B498-43B3-948B-1728B52AA6E4}">
                 <adec:decorative xmlns:adec="http://schemas.microsoft.com/office/drawing/2017/decorative" val="1"/>
@@ -28916,9 +28925,25 @@
           <a:prstGeom prst="rect">
             <a:avLst/>
           </a:prstGeom>
-          <a:ln>
+          <a:ln w="12700" cap="flat" cmpd="sng" algn="ctr">
             <a:noFill/>
+            <a:prstDash val="solid"/>
+            <a:miter lim="800000"/>
           </a:ln>
+          <a:effectLst/>
+          <a:extLst>
+            <a:ext uri="{91240B29-F687-4F45-9708-019B960494DF}">
+              <a14:hiddenLine xmlns:a14="http://schemas.microsoft.com/office/drawing/2010/main" w="12700" cap="flat" cmpd="sng" algn="ctr">
+                <a:solidFill>
+                  <a:schemeClr val="accent1">
+                    <a:shade val="50000"/>
+                  </a:schemeClr>
+                </a:solidFill>
+                <a:prstDash val="solid"/>
+                <a:miter lim="800000"/>
+              </a14:hiddenLine>
+            </a:ext>
+          </a:extLst>
         </p:spPr>
         <p:style>
           <a:lnRef idx="2">
@@ -28941,78 +28966,16 @@
           <a:lstStyle/>
           <a:p>
             <a:pPr algn="ctr"/>
-            <a:endParaRPr lang="en-US" dirty="0"/>
+            <a:endParaRPr lang="en-US"/>
           </a:p>
         </p:txBody>
       </p:sp>
-      <p:cxnSp>
-        <p:nvCxnSpPr>
-          <p:cNvPr id="32" name="Straight Connector 31">
+      <p:sp>
+        <p:nvSpPr>
+          <p:cNvPr id="2" name="Title 1">
             <a:extLst>
               <a:ext uri="{FF2B5EF4-FFF2-40B4-BE49-F238E27FC236}">
-                <a16:creationId xmlns:a16="http://schemas.microsoft.com/office/drawing/2014/main" id="{7EB498BD-8089-4626-91EA-4978EBEF535E}"/>
-              </a:ext>
-              <a:ext uri="{C183D7F6-B498-43B3-948B-1728B52AA6E4}">
-                <adec:decorative xmlns:adec="http://schemas.microsoft.com/office/drawing/2017/decorative" val="1"/>
-              </a:ext>
-            </a:extLst>
-          </p:cNvPr>
-          <p:cNvCxnSpPr>
-            <a:cxnSpLocks noGrp="1" noRot="1" noChangeAspect="1" noMove="1" noResize="1" noEditPoints="1" noAdjustHandles="1" noChangeArrowheads="1" noChangeShapeType="1"/>
-          </p:cNvCxnSpPr>
-          <p:nvPr>
-            <p:extLst>
-              <p:ext uri="{386F3935-93C4-4BCD-93E2-E3B085C9AB24}">
-                <p16:designElem xmlns:p16="http://schemas.microsoft.com/office/powerpoint/2015/main" val="1"/>
-              </p:ext>
-            </p:extLst>
-          </p:nvPr>
-        </p:nvCxnSpPr>
-        <p:spPr>
-          <a:xfrm>
-            <a:off x="0" y="806470"/>
-            <a:ext cx="7903723" cy="0"/>
-          </a:xfrm>
-          <a:prstGeom prst="line">
-            <a:avLst/>
-          </a:prstGeom>
-          <a:ln w="25400" cap="sq">
-            <a:gradFill flip="none" rotWithShape="1">
-              <a:gsLst>
-                <a:gs pos="0">
-                  <a:schemeClr val="accent1"/>
-                </a:gs>
-                <a:gs pos="100000">
-                  <a:schemeClr val="accent2"/>
-                </a:gs>
-              </a:gsLst>
-              <a:lin ang="10800000" scaled="0"/>
-              <a:tileRect/>
-            </a:gradFill>
-            <a:bevel/>
-          </a:ln>
-        </p:spPr>
-        <p:style>
-          <a:lnRef idx="1">
-            <a:schemeClr val="accent1"/>
-          </a:lnRef>
-          <a:fillRef idx="0">
-            <a:schemeClr val="accent1"/>
-          </a:fillRef>
-          <a:effectRef idx="0">
-            <a:schemeClr val="accent1"/>
-          </a:effectRef>
-          <a:fontRef idx="minor">
-            <a:schemeClr val="tx1"/>
-          </a:fontRef>
-        </p:style>
-      </p:cxnSp>
-      <p:sp>
-        <p:nvSpPr>
-          <p:cNvPr id="25" name="Content Placeholder 2">
-            <a:extLst>
-              <a:ext uri="{FF2B5EF4-FFF2-40B4-BE49-F238E27FC236}">
-                <a16:creationId xmlns:a16="http://schemas.microsoft.com/office/drawing/2014/main" id="{2D2A7C81-EE7C-497D-B9F8-03F828F13F67}"/>
+                <a16:creationId xmlns:a16="http://schemas.microsoft.com/office/drawing/2014/main" id="{1B4744F0-EAC8-4D16-928E-EDAA653D59D8}"/>
               </a:ext>
             </a:extLst>
           </p:cNvPr>
@@ -29020,142 +28983,42 @@
             <a:spLocks noGrp="1"/>
           </p:cNvSpPr>
           <p:nvPr>
-            <p:ph idx="1"/>
+            <p:ph type="ctrTitle"/>
           </p:nvPr>
         </p:nvSpPr>
         <p:spPr>
           <a:xfrm>
-            <a:off x="803776" y="1322968"/>
-            <a:ext cx="6190412" cy="4850822"/>
+            <a:off x="1137034" y="609600"/>
+            <a:ext cx="6478417" cy="1322887"/>
           </a:xfrm>
         </p:spPr>
         <p:txBody>
-          <a:bodyPr anchor="t">
+          <a:bodyPr vert="horz" lIns="91440" tIns="45720" rIns="91440" bIns="45720" rtlCol="0" anchor="ctr">
             <a:normAutofit/>
           </a:bodyPr>
           <a:lstStyle/>
           <a:p>
+            <a:pPr algn="l"/>
             <a:r>
-              <a:rPr lang="en-GB" sz="1900" dirty="0">
+              <a:rPr lang="en-US" sz="4400" kern="1200" dirty="0">
                 <a:solidFill>
-                  <a:schemeClr val="tx1">
-                    <a:alpha val="80000"/>
-                  </a:schemeClr>
+                  <a:schemeClr val="tx1"/>
                 </a:solidFill>
+                <a:latin typeface="+mj-lt"/>
+                <a:ea typeface="+mj-ea"/>
+                <a:cs typeface="+mj-cs"/>
               </a:rPr>
-              <a:t>The current E-com could be better, that why we decided to develop this system for the next generations of our faculty.</a:t>
-            </a:r>
-          </a:p>
-          <a:p>
-            <a:endParaRPr lang="en-GB" sz="1900" dirty="0">
-              <a:solidFill>
-                <a:schemeClr val="tx1">
-                  <a:alpha val="80000"/>
-                </a:schemeClr>
-              </a:solidFill>
-            </a:endParaRPr>
-          </a:p>
-          <a:p>
-            <a:r>
-              <a:rPr lang="en-GB" sz="1900" dirty="0">
-                <a:solidFill>
-                  <a:schemeClr val="tx1">
-                    <a:alpha val="80000"/>
-                  </a:schemeClr>
-                </a:solidFill>
-              </a:rPr>
-              <a:t>Developing such system is not an easy task, the E-com is a complex system with nearly unlimited number of details.</a:t>
-            </a:r>
-          </a:p>
-          <a:p>
-            <a:endParaRPr lang="en-GB" sz="1900" dirty="0">
-              <a:solidFill>
-                <a:schemeClr val="tx1">
-                  <a:alpha val="80000"/>
-                </a:schemeClr>
-              </a:solidFill>
-            </a:endParaRPr>
-          </a:p>
-          <a:p>
-            <a:r>
-              <a:rPr lang="en-GB" sz="1900" dirty="0">
-                <a:solidFill>
-                  <a:schemeClr val="tx1">
-                    <a:alpha val="80000"/>
-                  </a:schemeClr>
-                </a:solidFill>
-              </a:rPr>
-              <a:t>Developing a complex system requires good management of resources and great communication between the project members.</a:t>
-            </a:r>
-          </a:p>
-          <a:p>
-            <a:endParaRPr lang="en-GB" sz="1900" dirty="0">
-              <a:solidFill>
-                <a:schemeClr val="tx1">
-                  <a:alpha val="80000"/>
-                </a:schemeClr>
-              </a:solidFill>
-            </a:endParaRPr>
-          </a:p>
-          <a:p>
-            <a:r>
-              <a:rPr lang="en-GB" sz="1900" dirty="0">
-                <a:solidFill>
-                  <a:schemeClr val="tx1">
-                    <a:alpha val="80000"/>
-                  </a:schemeClr>
-                </a:solidFill>
-              </a:rPr>
-              <a:t>However, by applying the software engineering concepts that we studied throughout our journey in the faculty and with of our supervisors, we hope that we are able to do it.</a:t>
+              <a:t>Lessons Learned</a:t>
             </a:r>
           </a:p>
         </p:txBody>
       </p:sp>
-      <p:pic>
-        <p:nvPicPr>
-          <p:cNvPr id="7" name="Graphic 6" descr="Open Hand with Plant">
+      <p:sp>
+        <p:nvSpPr>
+          <p:cNvPr id="32" name="Freeform: Shape 31">
             <a:extLst>
               <a:ext uri="{FF2B5EF4-FFF2-40B4-BE49-F238E27FC236}">
-                <a16:creationId xmlns:a16="http://schemas.microsoft.com/office/drawing/2014/main" id="{6CB8E202-BE19-465D-927B-9BDF03692B8E}"/>
-              </a:ext>
-            </a:extLst>
-          </p:cNvPr>
-          <p:cNvPicPr>
-            <a:picLocks noChangeAspect="1"/>
-          </p:cNvPicPr>
-          <p:nvPr/>
-        </p:nvPicPr>
-        <p:blipFill>
-          <a:blip r:embed="rId2">
-            <a:extLst>
-              <a:ext uri="{28A0092B-C50C-407E-A947-70E740481C1C}">
-                <a14:useLocalDpi xmlns:a14="http://schemas.microsoft.com/office/drawing/2010/main" val="0"/>
-              </a:ext>
-              <a:ext uri="{96DAC541-7B7A-43D3-8B79-37D633B846F1}">
-                <asvg:svgBlip xmlns:asvg="http://schemas.microsoft.com/office/drawing/2016/SVG/main" r:embed="rId3"/>
-              </a:ext>
-            </a:extLst>
-          </a:blip>
-          <a:stretch>
-            <a:fillRect/>
-          </a:stretch>
-        </p:blipFill>
-        <p:spPr>
-          <a:xfrm>
-            <a:off x="7572653" y="1980885"/>
-            <a:ext cx="3548404" cy="3548404"/>
-          </a:xfrm>
-          <a:prstGeom prst="rect">
-            <a:avLst/>
-          </a:prstGeom>
-        </p:spPr>
-      </p:pic>
-      <p:sp>
-        <p:nvSpPr>
-          <p:cNvPr id="34" name="Graphic 11">
-            <a:extLst>
-              <a:ext uri="{FF2B5EF4-FFF2-40B4-BE49-F238E27FC236}">
-                <a16:creationId xmlns:a16="http://schemas.microsoft.com/office/drawing/2014/main" id="{6CB927A4-E432-4310-9CD5-E89FF5063179}"/>
+                <a16:creationId xmlns:a16="http://schemas.microsoft.com/office/drawing/2014/main" id="{C1657055-16FE-41A2-B207-7880F6DCAB24}"/>
               </a:ext>
               <a:ext uri="{C183D7F6-B498-43B3-948B-1728B52AA6E4}">
                 <adec:decorative xmlns:adec="http://schemas.microsoft.com/office/drawing/2017/decorative" val="1"/>
@@ -29174,47 +29037,229 @@
           </p:nvPr>
         </p:nvSpPr>
         <p:spPr>
-          <a:xfrm>
-            <a:off x="10924552" y="1899284"/>
-            <a:ext cx="139039" cy="139039"/>
+          <a:xfrm flipH="1">
+            <a:off x="4589924" y="2"/>
+            <a:ext cx="7602076" cy="470844"/>
           </a:xfrm>
           <a:custGeom>
             <a:avLst/>
             <a:gdLst>
-              <a:gd name="connsiteX0" fmla="*/ 129602 w 139039"/>
-              <a:gd name="connsiteY0" fmla="*/ 60082 h 139039"/>
-              <a:gd name="connsiteX1" fmla="*/ 78957 w 139039"/>
-              <a:gd name="connsiteY1" fmla="*/ 60082 h 139039"/>
-              <a:gd name="connsiteX2" fmla="*/ 78957 w 139039"/>
-              <a:gd name="connsiteY2" fmla="*/ 9437 h 139039"/>
-              <a:gd name="connsiteX3" fmla="*/ 69520 w 139039"/>
-              <a:gd name="connsiteY3" fmla="*/ 0 h 139039"/>
-              <a:gd name="connsiteX4" fmla="*/ 60082 w 139039"/>
-              <a:gd name="connsiteY4" fmla="*/ 9437 h 139039"/>
-              <a:gd name="connsiteX5" fmla="*/ 60082 w 139039"/>
-              <a:gd name="connsiteY5" fmla="*/ 60082 h 139039"/>
-              <a:gd name="connsiteX6" fmla="*/ 9437 w 139039"/>
-              <a:gd name="connsiteY6" fmla="*/ 60082 h 139039"/>
-              <a:gd name="connsiteX7" fmla="*/ 0 w 139039"/>
-              <a:gd name="connsiteY7" fmla="*/ 69520 h 139039"/>
-              <a:gd name="connsiteX8" fmla="*/ 9437 w 139039"/>
-              <a:gd name="connsiteY8" fmla="*/ 78957 h 139039"/>
-              <a:gd name="connsiteX9" fmla="*/ 60082 w 139039"/>
-              <a:gd name="connsiteY9" fmla="*/ 78957 h 139039"/>
-              <a:gd name="connsiteX10" fmla="*/ 60082 w 139039"/>
-              <a:gd name="connsiteY10" fmla="*/ 129602 h 139039"/>
-              <a:gd name="connsiteX11" fmla="*/ 69520 w 139039"/>
-              <a:gd name="connsiteY11" fmla="*/ 139039 h 139039"/>
-              <a:gd name="connsiteX12" fmla="*/ 78957 w 139039"/>
-              <a:gd name="connsiteY12" fmla="*/ 129602 h 139039"/>
-              <a:gd name="connsiteX13" fmla="*/ 78957 w 139039"/>
-              <a:gd name="connsiteY13" fmla="*/ 78957 h 139039"/>
-              <a:gd name="connsiteX14" fmla="*/ 129602 w 139039"/>
-              <a:gd name="connsiteY14" fmla="*/ 78957 h 139039"/>
-              <a:gd name="connsiteX15" fmla="*/ 139039 w 139039"/>
-              <a:gd name="connsiteY15" fmla="*/ 69520 h 139039"/>
-              <a:gd name="connsiteX16" fmla="*/ 129602 w 139039"/>
-              <a:gd name="connsiteY16" fmla="*/ 60082 h 139039"/>
+              <a:gd name="connsiteX0" fmla="*/ 9683888 w 9683888"/>
+              <a:gd name="connsiteY0" fmla="*/ 0 h 743457"/>
+              <a:gd name="connsiteX1" fmla="*/ 0 w 9683888"/>
+              <a:gd name="connsiteY1" fmla="*/ 0 h 743457"/>
+              <a:gd name="connsiteX2" fmla="*/ 0 w 9683888"/>
+              <a:gd name="connsiteY2" fmla="*/ 365878 h 743457"/>
+              <a:gd name="connsiteX3" fmla="*/ 11844 w 9683888"/>
+              <a:gd name="connsiteY3" fmla="*/ 367909 h 743457"/>
+              <a:gd name="connsiteX4" fmla="*/ 106208 w 9683888"/>
+              <a:gd name="connsiteY4" fmla="*/ 385974 h 743457"/>
+              <a:gd name="connsiteX5" fmla="*/ 183667 w 9683888"/>
+              <a:gd name="connsiteY5" fmla="*/ 399162 h 743457"/>
+              <a:gd name="connsiteX6" fmla="*/ 292430 w 9683888"/>
+              <a:gd name="connsiteY6" fmla="*/ 390408 h 743457"/>
+              <a:gd name="connsiteX7" fmla="*/ 386942 w 9683888"/>
+              <a:gd name="connsiteY7" fmla="*/ 395582 h 743457"/>
+              <a:gd name="connsiteX8" fmla="*/ 485751 w 9683888"/>
+              <a:gd name="connsiteY8" fmla="*/ 408404 h 743457"/>
+              <a:gd name="connsiteX9" fmla="*/ 604107 w 9683888"/>
+              <a:gd name="connsiteY9" fmla="*/ 418647 h 743457"/>
+              <a:gd name="connsiteX10" fmla="*/ 694081 w 9683888"/>
+              <a:gd name="connsiteY10" fmla="*/ 449524 h 743457"/>
+              <a:gd name="connsiteX11" fmla="*/ 762452 w 9683888"/>
+              <a:gd name="connsiteY11" fmla="*/ 456090 h 743457"/>
+              <a:gd name="connsiteX12" fmla="*/ 987872 w 9683888"/>
+              <a:gd name="connsiteY12" fmla="*/ 481862 h 743457"/>
+              <a:gd name="connsiteX13" fmla="*/ 1077163 w 9683888"/>
+              <a:gd name="connsiteY13" fmla="*/ 524467 h 743457"/>
+              <a:gd name="connsiteX14" fmla="*/ 1258716 w 9683888"/>
+              <a:gd name="connsiteY14" fmla="*/ 587975 h 743457"/>
+              <a:gd name="connsiteX15" fmla="*/ 1298056 w 9683888"/>
+              <a:gd name="connsiteY15" fmla="*/ 595413 h 743457"/>
+              <a:gd name="connsiteX16" fmla="*/ 1327017 w 9683888"/>
+              <a:gd name="connsiteY16" fmla="*/ 617412 h 743457"/>
+              <a:gd name="connsiteX17" fmla="*/ 1347909 w 9683888"/>
+              <a:gd name="connsiteY17" fmla="*/ 620209 h 743457"/>
+              <a:gd name="connsiteX18" fmla="*/ 1421792 w 9683888"/>
+              <a:gd name="connsiteY18" fmla="*/ 626139 h 743457"/>
+              <a:gd name="connsiteX19" fmla="*/ 1519789 w 9683888"/>
+              <a:gd name="connsiteY19" fmla="*/ 645011 h 743457"/>
+              <a:gd name="connsiteX20" fmla="*/ 1620886 w 9683888"/>
+              <a:gd name="connsiteY20" fmla="*/ 687715 h 743457"/>
+              <a:gd name="connsiteX21" fmla="*/ 1676745 w 9683888"/>
+              <a:gd name="connsiteY21" fmla="*/ 690130 h 743457"/>
+              <a:gd name="connsiteX22" fmla="*/ 1832228 w 9683888"/>
+              <a:gd name="connsiteY22" fmla="*/ 690860 h 743457"/>
+              <a:gd name="connsiteX23" fmla="*/ 1980464 w 9683888"/>
+              <a:gd name="connsiteY23" fmla="*/ 704858 h 743457"/>
+              <a:gd name="connsiteX24" fmla="*/ 2051150 w 9683888"/>
+              <a:gd name="connsiteY24" fmla="*/ 711187 h 743457"/>
+              <a:gd name="connsiteX25" fmla="*/ 2162824 w 9683888"/>
+              <a:gd name="connsiteY25" fmla="*/ 709178 h 743457"/>
+              <a:gd name="connsiteX26" fmla="*/ 2259859 w 9683888"/>
+              <a:gd name="connsiteY26" fmla="*/ 718188 h 743457"/>
+              <a:gd name="connsiteX27" fmla="*/ 2378290 w 9683888"/>
+              <a:gd name="connsiteY27" fmla="*/ 738748 h 743457"/>
+              <a:gd name="connsiteX28" fmla="*/ 2407828 w 9683888"/>
+              <a:gd name="connsiteY28" fmla="*/ 743457 h 743457"/>
+              <a:gd name="connsiteX29" fmla="*/ 2428936 w 9683888"/>
+              <a:gd name="connsiteY29" fmla="*/ 734697 h 743457"/>
+              <a:gd name="connsiteX30" fmla="*/ 2646106 w 9683888"/>
+              <a:gd name="connsiteY30" fmla="*/ 660204 h 743457"/>
+              <a:gd name="connsiteX31" fmla="*/ 2799920 w 9683888"/>
+              <a:gd name="connsiteY31" fmla="*/ 630451 h 743457"/>
+              <a:gd name="connsiteX32" fmla="*/ 2953556 w 9683888"/>
+              <a:gd name="connsiteY32" fmla="*/ 607173 h 743457"/>
+              <a:gd name="connsiteX33" fmla="*/ 3009839 w 9683888"/>
+              <a:gd name="connsiteY33" fmla="*/ 601743 h 743457"/>
+              <a:gd name="connsiteX34" fmla="*/ 3115016 w 9683888"/>
+              <a:gd name="connsiteY34" fmla="*/ 584982 h 743457"/>
+              <a:gd name="connsiteX35" fmla="*/ 3185844 w 9683888"/>
+              <a:gd name="connsiteY35" fmla="*/ 595356 h 743457"/>
+              <a:gd name="connsiteX36" fmla="*/ 3246013 w 9683888"/>
+              <a:gd name="connsiteY36" fmla="*/ 592418 h 743457"/>
+              <a:gd name="connsiteX37" fmla="*/ 3313565 w 9683888"/>
+              <a:gd name="connsiteY37" fmla="*/ 574138 h 743457"/>
+              <a:gd name="connsiteX38" fmla="*/ 3414143 w 9683888"/>
+              <a:gd name="connsiteY38" fmla="*/ 553730 h 743457"/>
+              <a:gd name="connsiteX39" fmla="*/ 3552895 w 9683888"/>
+              <a:gd name="connsiteY39" fmla="*/ 548563 h 743457"/>
+              <a:gd name="connsiteX40" fmla="*/ 3753012 w 9683888"/>
+              <a:gd name="connsiteY40" fmla="*/ 599520 h 743457"/>
+              <a:gd name="connsiteX41" fmla="*/ 3804392 w 9683888"/>
+              <a:gd name="connsiteY41" fmla="*/ 604131 h 743457"/>
+              <a:gd name="connsiteX42" fmla="*/ 3916696 w 9683888"/>
+              <a:gd name="connsiteY42" fmla="*/ 606540 h 743457"/>
+              <a:gd name="connsiteX43" fmla="*/ 4063849 w 9683888"/>
+              <a:gd name="connsiteY43" fmla="*/ 604058 h 743457"/>
+              <a:gd name="connsiteX44" fmla="*/ 4172179 w 9683888"/>
+              <a:gd name="connsiteY44" fmla="*/ 592355 h 743457"/>
+              <a:gd name="connsiteX45" fmla="*/ 4276294 w 9683888"/>
+              <a:gd name="connsiteY45" fmla="*/ 587119 h 743457"/>
+              <a:gd name="connsiteX46" fmla="*/ 4411090 w 9683888"/>
+              <a:gd name="connsiteY46" fmla="*/ 575600 h 743457"/>
+              <a:gd name="connsiteX47" fmla="*/ 4540465 w 9683888"/>
+              <a:gd name="connsiteY47" fmla="*/ 567464 h 743457"/>
+              <a:gd name="connsiteX48" fmla="*/ 4545352 w 9683888"/>
+              <a:gd name="connsiteY48" fmla="*/ 555554 h 743457"/>
+              <a:gd name="connsiteX49" fmla="*/ 4564014 w 9683888"/>
+              <a:gd name="connsiteY49" fmla="*/ 553660 h 743457"/>
+              <a:gd name="connsiteX50" fmla="*/ 4568602 w 9683888"/>
+              <a:gd name="connsiteY50" fmla="*/ 550913 h 743457"/>
+              <a:gd name="connsiteX51" fmla="*/ 4595289 w 9683888"/>
+              <a:gd name="connsiteY51" fmla="*/ 537407 h 743457"/>
+              <a:gd name="connsiteX52" fmla="*/ 4739026 w 9683888"/>
+              <a:gd name="connsiteY52" fmla="*/ 532483 h 743457"/>
+              <a:gd name="connsiteX53" fmla="*/ 5061335 w 9683888"/>
+              <a:gd name="connsiteY53" fmla="*/ 545635 h 743457"/>
+              <a:gd name="connsiteX54" fmla="*/ 5338634 w 9683888"/>
+              <a:gd name="connsiteY54" fmla="*/ 595754 h 743457"/>
+              <a:gd name="connsiteX55" fmla="*/ 5529430 w 9683888"/>
+              <a:gd name="connsiteY55" fmla="*/ 606335 h 743457"/>
+              <a:gd name="connsiteX56" fmla="*/ 5604039 w 9683888"/>
+              <a:gd name="connsiteY56" fmla="*/ 607676 h 743457"/>
+              <a:gd name="connsiteX57" fmla="*/ 5625281 w 9683888"/>
+              <a:gd name="connsiteY57" fmla="*/ 617253 h 743457"/>
+              <a:gd name="connsiteX58" fmla="*/ 5628138 w 9683888"/>
+              <a:gd name="connsiteY58" fmla="*/ 615483 h 743457"/>
+              <a:gd name="connsiteX59" fmla="*/ 5653593 w 9683888"/>
+              <a:gd name="connsiteY59" fmla="*/ 617873 h 743457"/>
+              <a:gd name="connsiteX60" fmla="*/ 5658658 w 9683888"/>
+              <a:gd name="connsiteY60" fmla="*/ 624279 h 743457"/>
+              <a:gd name="connsiteX61" fmla="*/ 5675963 w 9683888"/>
+              <a:gd name="connsiteY61" fmla="*/ 627762 h 743457"/>
+              <a:gd name="connsiteX62" fmla="*/ 5709625 w 9683888"/>
+              <a:gd name="connsiteY62" fmla="*/ 639593 h 743457"/>
+              <a:gd name="connsiteX63" fmla="*/ 5716324 w 9683888"/>
+              <a:gd name="connsiteY63" fmla="*/ 637148 h 743457"/>
+              <a:gd name="connsiteX64" fmla="*/ 5767720 w 9683888"/>
+              <a:gd name="connsiteY64" fmla="*/ 647737 h 743457"/>
+              <a:gd name="connsiteX65" fmla="*/ 5768619 w 9683888"/>
+              <a:gd name="connsiteY65" fmla="*/ 645671 h 743457"/>
+              <a:gd name="connsiteX66" fmla="*/ 5858696 w 9683888"/>
+              <a:gd name="connsiteY66" fmla="*/ 628099 h 743457"/>
+              <a:gd name="connsiteX67" fmla="*/ 5935260 w 9683888"/>
+              <a:gd name="connsiteY67" fmla="*/ 596904 h 743457"/>
+              <a:gd name="connsiteX68" fmla="*/ 5946176 w 9683888"/>
+              <a:gd name="connsiteY68" fmla="*/ 597874 h 743457"/>
+              <a:gd name="connsiteX69" fmla="*/ 5946447 w 9683888"/>
+              <a:gd name="connsiteY69" fmla="*/ 597396 h 743457"/>
+              <a:gd name="connsiteX70" fmla="*/ 5958069 w 9683888"/>
+              <a:gd name="connsiteY70" fmla="*/ 597432 h 743457"/>
+              <a:gd name="connsiteX71" fmla="*/ 5966081 w 9683888"/>
+              <a:gd name="connsiteY71" fmla="*/ 599643 h 743457"/>
+              <a:gd name="connsiteX72" fmla="*/ 5987259 w 9683888"/>
+              <a:gd name="connsiteY72" fmla="*/ 601523 h 743457"/>
+              <a:gd name="connsiteX73" fmla="*/ 5994905 w 9683888"/>
+              <a:gd name="connsiteY73" fmla="*/ 598873 h 743457"/>
+              <a:gd name="connsiteX74" fmla="*/ 6054803 w 9683888"/>
+              <a:gd name="connsiteY74" fmla="*/ 541202 h 743457"/>
+              <a:gd name="connsiteX75" fmla="*/ 6188672 w 9683888"/>
+              <a:gd name="connsiteY75" fmla="*/ 496389 h 743457"/>
+              <a:gd name="connsiteX76" fmla="*/ 6323280 w 9683888"/>
+              <a:gd name="connsiteY76" fmla="*/ 458013 h 743457"/>
+              <a:gd name="connsiteX77" fmla="*/ 6457257 w 9683888"/>
+              <a:gd name="connsiteY77" fmla="*/ 414621 h 743457"/>
+              <a:gd name="connsiteX78" fmla="*/ 6530019 w 9683888"/>
+              <a:gd name="connsiteY78" fmla="*/ 423168 h 743457"/>
+              <a:gd name="connsiteX79" fmla="*/ 6626800 w 9683888"/>
+              <a:gd name="connsiteY79" fmla="*/ 375078 h 743457"/>
+              <a:gd name="connsiteX80" fmla="*/ 6689231 w 9683888"/>
+              <a:gd name="connsiteY80" fmla="*/ 353501 h 743457"/>
+              <a:gd name="connsiteX81" fmla="*/ 6726440 w 9683888"/>
+              <a:gd name="connsiteY81" fmla="*/ 340276 h 743457"/>
+              <a:gd name="connsiteX82" fmla="*/ 6835228 w 9683888"/>
+              <a:gd name="connsiteY82" fmla="*/ 329393 h 743457"/>
+              <a:gd name="connsiteX83" fmla="*/ 7039363 w 9683888"/>
+              <a:gd name="connsiteY83" fmla="*/ 370823 h 743457"/>
+              <a:gd name="connsiteX84" fmla="*/ 7095156 w 9683888"/>
+              <a:gd name="connsiteY84" fmla="*/ 366075 h 743457"/>
+              <a:gd name="connsiteX85" fmla="*/ 7187061 w 9683888"/>
+              <a:gd name="connsiteY85" fmla="*/ 383876 h 743457"/>
+              <a:gd name="connsiteX86" fmla="*/ 7295039 w 9683888"/>
+              <a:gd name="connsiteY86" fmla="*/ 355046 h 743457"/>
+              <a:gd name="connsiteX87" fmla="*/ 7373651 w 9683888"/>
+              <a:gd name="connsiteY87" fmla="*/ 322299 h 743457"/>
+              <a:gd name="connsiteX88" fmla="*/ 7418964 w 9683888"/>
+              <a:gd name="connsiteY88" fmla="*/ 308685 h 743457"/>
+              <a:gd name="connsiteX89" fmla="*/ 7450568 w 9683888"/>
+              <a:gd name="connsiteY89" fmla="*/ 293511 h 743457"/>
+              <a:gd name="connsiteX90" fmla="*/ 7538380 w 9683888"/>
+              <a:gd name="connsiteY90" fmla="*/ 283235 h 743457"/>
+              <a:gd name="connsiteX91" fmla="*/ 7786348 w 9683888"/>
+              <a:gd name="connsiteY91" fmla="*/ 225377 h 743457"/>
+              <a:gd name="connsiteX92" fmla="*/ 7849534 w 9683888"/>
+              <a:gd name="connsiteY92" fmla="*/ 245434 h 743457"/>
+              <a:gd name="connsiteX93" fmla="*/ 7981165 w 9683888"/>
+              <a:gd name="connsiteY93" fmla="*/ 222252 h 743457"/>
+              <a:gd name="connsiteX94" fmla="*/ 8171882 w 9683888"/>
+              <a:gd name="connsiteY94" fmla="*/ 222497 h 743457"/>
+              <a:gd name="connsiteX95" fmla="*/ 8242270 w 9683888"/>
+              <a:gd name="connsiteY95" fmla="*/ 180535 h 743457"/>
+              <a:gd name="connsiteX96" fmla="*/ 8490152 w 9683888"/>
+              <a:gd name="connsiteY96" fmla="*/ 209193 h 743457"/>
+              <a:gd name="connsiteX97" fmla="*/ 8622272 w 9683888"/>
+              <a:gd name="connsiteY97" fmla="*/ 188859 h 743457"/>
+              <a:gd name="connsiteX98" fmla="*/ 8738606 w 9683888"/>
+              <a:gd name="connsiteY98" fmla="*/ 208945 h 743457"/>
+              <a:gd name="connsiteX99" fmla="*/ 8831307 w 9683888"/>
+              <a:gd name="connsiteY99" fmla="*/ 207738 h 743457"/>
+              <a:gd name="connsiteX100" fmla="*/ 8891432 w 9683888"/>
+              <a:gd name="connsiteY100" fmla="*/ 184510 h 743457"/>
+              <a:gd name="connsiteX101" fmla="*/ 8946980 w 9683888"/>
+              <a:gd name="connsiteY101" fmla="*/ 145578 h 743457"/>
+              <a:gd name="connsiteX102" fmla="*/ 9107760 w 9683888"/>
+              <a:gd name="connsiteY102" fmla="*/ 128052 h 743457"/>
+              <a:gd name="connsiteX103" fmla="*/ 9195623 w 9683888"/>
+              <a:gd name="connsiteY103" fmla="*/ 100212 h 743457"/>
+              <a:gd name="connsiteX104" fmla="*/ 9256898 w 9683888"/>
+              <a:gd name="connsiteY104" fmla="*/ 73900 h 743457"/>
+              <a:gd name="connsiteX105" fmla="*/ 9351740 w 9683888"/>
+              <a:gd name="connsiteY105" fmla="*/ 80439 h 743457"/>
+              <a:gd name="connsiteX106" fmla="*/ 9539796 w 9683888"/>
+              <a:gd name="connsiteY106" fmla="*/ 87069 h 743457"/>
+              <a:gd name="connsiteX107" fmla="*/ 9619109 w 9683888"/>
+              <a:gd name="connsiteY107" fmla="*/ 39994 h 743457"/>
             </a:gdLst>
             <a:ahLst/>
             <a:cxnLst>
@@ -29269,104 +29314,916 @@
               <a:cxn ang="0">
                 <a:pos x="connsiteX16" y="connsiteY16"/>
               </a:cxn>
+              <a:cxn ang="0">
+                <a:pos x="connsiteX17" y="connsiteY17"/>
+              </a:cxn>
+              <a:cxn ang="0">
+                <a:pos x="connsiteX18" y="connsiteY18"/>
+              </a:cxn>
+              <a:cxn ang="0">
+                <a:pos x="connsiteX19" y="connsiteY19"/>
+              </a:cxn>
+              <a:cxn ang="0">
+                <a:pos x="connsiteX20" y="connsiteY20"/>
+              </a:cxn>
+              <a:cxn ang="0">
+                <a:pos x="connsiteX21" y="connsiteY21"/>
+              </a:cxn>
+              <a:cxn ang="0">
+                <a:pos x="connsiteX22" y="connsiteY22"/>
+              </a:cxn>
+              <a:cxn ang="0">
+                <a:pos x="connsiteX23" y="connsiteY23"/>
+              </a:cxn>
+              <a:cxn ang="0">
+                <a:pos x="connsiteX24" y="connsiteY24"/>
+              </a:cxn>
+              <a:cxn ang="0">
+                <a:pos x="connsiteX25" y="connsiteY25"/>
+              </a:cxn>
+              <a:cxn ang="0">
+                <a:pos x="connsiteX26" y="connsiteY26"/>
+              </a:cxn>
+              <a:cxn ang="0">
+                <a:pos x="connsiteX27" y="connsiteY27"/>
+              </a:cxn>
+              <a:cxn ang="0">
+                <a:pos x="connsiteX28" y="connsiteY28"/>
+              </a:cxn>
+              <a:cxn ang="0">
+                <a:pos x="connsiteX29" y="connsiteY29"/>
+              </a:cxn>
+              <a:cxn ang="0">
+                <a:pos x="connsiteX30" y="connsiteY30"/>
+              </a:cxn>
+              <a:cxn ang="0">
+                <a:pos x="connsiteX31" y="connsiteY31"/>
+              </a:cxn>
+              <a:cxn ang="0">
+                <a:pos x="connsiteX32" y="connsiteY32"/>
+              </a:cxn>
+              <a:cxn ang="0">
+                <a:pos x="connsiteX33" y="connsiteY33"/>
+              </a:cxn>
+              <a:cxn ang="0">
+                <a:pos x="connsiteX34" y="connsiteY34"/>
+              </a:cxn>
+              <a:cxn ang="0">
+                <a:pos x="connsiteX35" y="connsiteY35"/>
+              </a:cxn>
+              <a:cxn ang="0">
+                <a:pos x="connsiteX36" y="connsiteY36"/>
+              </a:cxn>
+              <a:cxn ang="0">
+                <a:pos x="connsiteX37" y="connsiteY37"/>
+              </a:cxn>
+              <a:cxn ang="0">
+                <a:pos x="connsiteX38" y="connsiteY38"/>
+              </a:cxn>
+              <a:cxn ang="0">
+                <a:pos x="connsiteX39" y="connsiteY39"/>
+              </a:cxn>
+              <a:cxn ang="0">
+                <a:pos x="connsiteX40" y="connsiteY40"/>
+              </a:cxn>
+              <a:cxn ang="0">
+                <a:pos x="connsiteX41" y="connsiteY41"/>
+              </a:cxn>
+              <a:cxn ang="0">
+                <a:pos x="connsiteX42" y="connsiteY42"/>
+              </a:cxn>
+              <a:cxn ang="0">
+                <a:pos x="connsiteX43" y="connsiteY43"/>
+              </a:cxn>
+              <a:cxn ang="0">
+                <a:pos x="connsiteX44" y="connsiteY44"/>
+              </a:cxn>
+              <a:cxn ang="0">
+                <a:pos x="connsiteX45" y="connsiteY45"/>
+              </a:cxn>
+              <a:cxn ang="0">
+                <a:pos x="connsiteX46" y="connsiteY46"/>
+              </a:cxn>
+              <a:cxn ang="0">
+                <a:pos x="connsiteX47" y="connsiteY47"/>
+              </a:cxn>
+              <a:cxn ang="0">
+                <a:pos x="connsiteX48" y="connsiteY48"/>
+              </a:cxn>
+              <a:cxn ang="0">
+                <a:pos x="connsiteX49" y="connsiteY49"/>
+              </a:cxn>
+              <a:cxn ang="0">
+                <a:pos x="connsiteX50" y="connsiteY50"/>
+              </a:cxn>
+              <a:cxn ang="0">
+                <a:pos x="connsiteX51" y="connsiteY51"/>
+              </a:cxn>
+              <a:cxn ang="0">
+                <a:pos x="connsiteX52" y="connsiteY52"/>
+              </a:cxn>
+              <a:cxn ang="0">
+                <a:pos x="connsiteX53" y="connsiteY53"/>
+              </a:cxn>
+              <a:cxn ang="0">
+                <a:pos x="connsiteX54" y="connsiteY54"/>
+              </a:cxn>
+              <a:cxn ang="0">
+                <a:pos x="connsiteX55" y="connsiteY55"/>
+              </a:cxn>
+              <a:cxn ang="0">
+                <a:pos x="connsiteX56" y="connsiteY56"/>
+              </a:cxn>
+              <a:cxn ang="0">
+                <a:pos x="connsiteX57" y="connsiteY57"/>
+              </a:cxn>
+              <a:cxn ang="0">
+                <a:pos x="connsiteX58" y="connsiteY58"/>
+              </a:cxn>
+              <a:cxn ang="0">
+                <a:pos x="connsiteX59" y="connsiteY59"/>
+              </a:cxn>
+              <a:cxn ang="0">
+                <a:pos x="connsiteX60" y="connsiteY60"/>
+              </a:cxn>
+              <a:cxn ang="0">
+                <a:pos x="connsiteX61" y="connsiteY61"/>
+              </a:cxn>
+              <a:cxn ang="0">
+                <a:pos x="connsiteX62" y="connsiteY62"/>
+              </a:cxn>
+              <a:cxn ang="0">
+                <a:pos x="connsiteX63" y="connsiteY63"/>
+              </a:cxn>
+              <a:cxn ang="0">
+                <a:pos x="connsiteX64" y="connsiteY64"/>
+              </a:cxn>
+              <a:cxn ang="0">
+                <a:pos x="connsiteX65" y="connsiteY65"/>
+              </a:cxn>
+              <a:cxn ang="0">
+                <a:pos x="connsiteX66" y="connsiteY66"/>
+              </a:cxn>
+              <a:cxn ang="0">
+                <a:pos x="connsiteX67" y="connsiteY67"/>
+              </a:cxn>
+              <a:cxn ang="0">
+                <a:pos x="connsiteX68" y="connsiteY68"/>
+              </a:cxn>
+              <a:cxn ang="0">
+                <a:pos x="connsiteX69" y="connsiteY69"/>
+              </a:cxn>
+              <a:cxn ang="0">
+                <a:pos x="connsiteX70" y="connsiteY70"/>
+              </a:cxn>
+              <a:cxn ang="0">
+                <a:pos x="connsiteX71" y="connsiteY71"/>
+              </a:cxn>
+              <a:cxn ang="0">
+                <a:pos x="connsiteX72" y="connsiteY72"/>
+              </a:cxn>
+              <a:cxn ang="0">
+                <a:pos x="connsiteX73" y="connsiteY73"/>
+              </a:cxn>
+              <a:cxn ang="0">
+                <a:pos x="connsiteX74" y="connsiteY74"/>
+              </a:cxn>
+              <a:cxn ang="0">
+                <a:pos x="connsiteX75" y="connsiteY75"/>
+              </a:cxn>
+              <a:cxn ang="0">
+                <a:pos x="connsiteX76" y="connsiteY76"/>
+              </a:cxn>
+              <a:cxn ang="0">
+                <a:pos x="connsiteX77" y="connsiteY77"/>
+              </a:cxn>
+              <a:cxn ang="0">
+                <a:pos x="connsiteX78" y="connsiteY78"/>
+              </a:cxn>
+              <a:cxn ang="0">
+                <a:pos x="connsiteX79" y="connsiteY79"/>
+              </a:cxn>
+              <a:cxn ang="0">
+                <a:pos x="connsiteX80" y="connsiteY80"/>
+              </a:cxn>
+              <a:cxn ang="0">
+                <a:pos x="connsiteX81" y="connsiteY81"/>
+              </a:cxn>
+              <a:cxn ang="0">
+                <a:pos x="connsiteX82" y="connsiteY82"/>
+              </a:cxn>
+              <a:cxn ang="0">
+                <a:pos x="connsiteX83" y="connsiteY83"/>
+              </a:cxn>
+              <a:cxn ang="0">
+                <a:pos x="connsiteX84" y="connsiteY84"/>
+              </a:cxn>
+              <a:cxn ang="0">
+                <a:pos x="connsiteX85" y="connsiteY85"/>
+              </a:cxn>
+              <a:cxn ang="0">
+                <a:pos x="connsiteX86" y="connsiteY86"/>
+              </a:cxn>
+              <a:cxn ang="0">
+                <a:pos x="connsiteX87" y="connsiteY87"/>
+              </a:cxn>
+              <a:cxn ang="0">
+                <a:pos x="connsiteX88" y="connsiteY88"/>
+              </a:cxn>
+              <a:cxn ang="0">
+                <a:pos x="connsiteX89" y="connsiteY89"/>
+              </a:cxn>
+              <a:cxn ang="0">
+                <a:pos x="connsiteX90" y="connsiteY90"/>
+              </a:cxn>
+              <a:cxn ang="0">
+                <a:pos x="connsiteX91" y="connsiteY91"/>
+              </a:cxn>
+              <a:cxn ang="0">
+                <a:pos x="connsiteX92" y="connsiteY92"/>
+              </a:cxn>
+              <a:cxn ang="0">
+                <a:pos x="connsiteX93" y="connsiteY93"/>
+              </a:cxn>
+              <a:cxn ang="0">
+                <a:pos x="connsiteX94" y="connsiteY94"/>
+              </a:cxn>
+              <a:cxn ang="0">
+                <a:pos x="connsiteX95" y="connsiteY95"/>
+              </a:cxn>
+              <a:cxn ang="0">
+                <a:pos x="connsiteX96" y="connsiteY96"/>
+              </a:cxn>
+              <a:cxn ang="0">
+                <a:pos x="connsiteX97" y="connsiteY97"/>
+              </a:cxn>
+              <a:cxn ang="0">
+                <a:pos x="connsiteX98" y="connsiteY98"/>
+              </a:cxn>
+              <a:cxn ang="0">
+                <a:pos x="connsiteX99" y="connsiteY99"/>
+              </a:cxn>
+              <a:cxn ang="0">
+                <a:pos x="connsiteX100" y="connsiteY100"/>
+              </a:cxn>
+              <a:cxn ang="0">
+                <a:pos x="connsiteX101" y="connsiteY101"/>
+              </a:cxn>
+              <a:cxn ang="0">
+                <a:pos x="connsiteX102" y="connsiteY102"/>
+              </a:cxn>
+              <a:cxn ang="0">
+                <a:pos x="connsiteX103" y="connsiteY103"/>
+              </a:cxn>
+              <a:cxn ang="0">
+                <a:pos x="connsiteX104" y="connsiteY104"/>
+              </a:cxn>
+              <a:cxn ang="0">
+                <a:pos x="connsiteX105" y="connsiteY105"/>
+              </a:cxn>
+              <a:cxn ang="0">
+                <a:pos x="connsiteX106" y="connsiteY106"/>
+              </a:cxn>
+              <a:cxn ang="0">
+                <a:pos x="connsiteX107" y="connsiteY107"/>
+              </a:cxn>
             </a:cxnLst>
             <a:rect l="l" t="t" r="r" b="b"/>
             <a:pathLst>
-              <a:path w="139039" h="139039">
+              <a:path w="9683888" h="743457">
                 <a:moveTo>
-                  <a:pt x="129602" y="60082"/>
+                  <a:pt x="9683888" y="0"/>
                 </a:moveTo>
                 <a:lnTo>
-                  <a:pt x="78957" y="60082"/>
+                  <a:pt x="0" y="0"/>
                 </a:lnTo>
                 <a:lnTo>
-                  <a:pt x="78957" y="9437"/>
+                  <a:pt x="0" y="365878"/>
+                </a:lnTo>
+                <a:lnTo>
+                  <a:pt x="11844" y="367909"/>
                 </a:lnTo>
                 <a:cubicBezTo>
-                  <a:pt x="78957" y="4225"/>
-                  <a:pt x="74731" y="0"/>
-                  <a:pt x="69520" y="0"/>
+                  <a:pt x="50423" y="374387"/>
+                  <a:pt x="87879" y="380746"/>
+                  <a:pt x="106208" y="385974"/>
                 </a:cubicBezTo>
                 <a:cubicBezTo>
-                  <a:pt x="64308" y="0"/>
-                  <a:pt x="60082" y="4225"/>
-                  <a:pt x="60082" y="9437"/>
+                  <a:pt x="119919" y="389979"/>
+                  <a:pt x="149687" y="402128"/>
+                  <a:pt x="183667" y="399162"/>
+                </a:cubicBezTo>
+                <a:cubicBezTo>
+                  <a:pt x="228274" y="394575"/>
+                  <a:pt x="256969" y="398315"/>
+                  <a:pt x="292430" y="390408"/>
+                </a:cubicBezTo>
+                <a:cubicBezTo>
+                  <a:pt x="325377" y="395694"/>
+                  <a:pt x="374510" y="420053"/>
+                  <a:pt x="386942" y="395582"/>
+                </a:cubicBezTo>
+                <a:cubicBezTo>
+                  <a:pt x="400429" y="416427"/>
+                  <a:pt x="451168" y="399411"/>
+                  <a:pt x="485751" y="408404"/>
+                </a:cubicBezTo>
+                <a:cubicBezTo>
+                  <a:pt x="520399" y="423586"/>
+                  <a:pt x="570416" y="404235"/>
+                  <a:pt x="604107" y="418647"/>
+                </a:cubicBezTo>
+                <a:cubicBezTo>
+                  <a:pt x="633631" y="425521"/>
+                  <a:pt x="672063" y="446364"/>
+                  <a:pt x="694081" y="449524"/>
+                </a:cubicBezTo>
+                <a:cubicBezTo>
+                  <a:pt x="700528" y="463278"/>
+                  <a:pt x="713487" y="450700"/>
+                  <a:pt x="762452" y="456090"/>
+                </a:cubicBezTo>
+                <a:cubicBezTo>
+                  <a:pt x="811417" y="461479"/>
+                  <a:pt x="935420" y="470466"/>
+                  <a:pt x="987872" y="481862"/>
+                </a:cubicBezTo>
+                <a:cubicBezTo>
+                  <a:pt x="1018493" y="475799"/>
+                  <a:pt x="1019470" y="516810"/>
+                  <a:pt x="1077163" y="524467"/>
+                </a:cubicBezTo>
+                <a:cubicBezTo>
+                  <a:pt x="1124222" y="535807"/>
+                  <a:pt x="1202940" y="574855"/>
+                  <a:pt x="1258716" y="587975"/>
+                </a:cubicBezTo>
+                <a:cubicBezTo>
+                  <a:pt x="1274181" y="586466"/>
+                  <a:pt x="1286859" y="589632"/>
+                  <a:pt x="1298056" y="595413"/>
                 </a:cubicBezTo>
                 <a:lnTo>
-                  <a:pt x="60082" y="60082"/>
+                  <a:pt x="1327017" y="617412"/>
                 </a:lnTo>
                 <a:lnTo>
-                  <a:pt x="9437" y="60082"/>
+                  <a:pt x="1347909" y="620209"/>
                 </a:lnTo>
                 <a:cubicBezTo>
-                  <a:pt x="4225" y="60082"/>
-                  <a:pt x="0" y="64308"/>
-                  <a:pt x="0" y="69520"/>
+                  <a:pt x="1377004" y="628445"/>
+                  <a:pt x="1394712" y="616344"/>
+                  <a:pt x="1421792" y="626139"/>
                 </a:cubicBezTo>
                 <a:cubicBezTo>
-                  <a:pt x="0" y="74731"/>
-                  <a:pt x="4225" y="78957"/>
-                  <a:pt x="9437" y="78957"/>
+                  <a:pt x="1466260" y="647543"/>
+                  <a:pt x="1506099" y="610975"/>
+                  <a:pt x="1519789" y="645011"/>
+                </a:cubicBezTo>
+                <a:cubicBezTo>
+                  <a:pt x="1556219" y="665699"/>
+                  <a:pt x="1578776" y="668950"/>
+                  <a:pt x="1620886" y="687715"/>
+                </a:cubicBezTo>
+                <a:cubicBezTo>
+                  <a:pt x="1658228" y="693647"/>
+                  <a:pt x="1636224" y="694371"/>
+                  <a:pt x="1676745" y="690130"/>
+                </a:cubicBezTo>
+                <a:cubicBezTo>
+                  <a:pt x="1713709" y="697532"/>
+                  <a:pt x="1774627" y="701403"/>
+                  <a:pt x="1832228" y="690860"/>
+                </a:cubicBezTo>
+                <a:cubicBezTo>
+                  <a:pt x="1866586" y="689181"/>
+                  <a:pt x="1949046" y="755765"/>
+                  <a:pt x="1980464" y="704858"/>
+                </a:cubicBezTo>
+                <a:cubicBezTo>
+                  <a:pt x="2001472" y="716610"/>
+                  <a:pt x="2020758" y="710467"/>
+                  <a:pt x="2051150" y="711187"/>
+                </a:cubicBezTo>
+                <a:cubicBezTo>
+                  <a:pt x="2081543" y="711907"/>
+                  <a:pt x="2117567" y="736153"/>
+                  <a:pt x="2162824" y="709178"/>
+                </a:cubicBezTo>
+                <a:cubicBezTo>
+                  <a:pt x="2219712" y="701824"/>
+                  <a:pt x="2181421" y="742368"/>
+                  <a:pt x="2259859" y="718188"/>
+                </a:cubicBezTo>
+                <a:cubicBezTo>
+                  <a:pt x="2296623" y="733933"/>
+                  <a:pt x="2337412" y="741012"/>
+                  <a:pt x="2378290" y="738748"/>
+                </a:cubicBezTo>
+                <a:cubicBezTo>
+                  <a:pt x="2380041" y="725410"/>
+                  <a:pt x="2399659" y="741017"/>
+                  <a:pt x="2407828" y="743457"/>
+                </a:cubicBezTo>
+                <a:cubicBezTo>
+                  <a:pt x="2406113" y="735180"/>
+                  <a:pt x="2421642" y="728742"/>
+                  <a:pt x="2428936" y="734697"/>
+                </a:cubicBezTo>
+                <a:cubicBezTo>
+                  <a:pt x="2468648" y="720822"/>
+                  <a:pt x="2584275" y="677579"/>
+                  <a:pt x="2646106" y="660204"/>
+                </a:cubicBezTo>
+                <a:cubicBezTo>
+                  <a:pt x="2706894" y="652346"/>
+                  <a:pt x="2738390" y="612318"/>
+                  <a:pt x="2799920" y="630451"/>
+                </a:cubicBezTo>
+                <a:cubicBezTo>
+                  <a:pt x="2856798" y="622940"/>
+                  <a:pt x="2902940" y="602232"/>
+                  <a:pt x="2953556" y="607173"/>
+                </a:cubicBezTo>
+                <a:cubicBezTo>
+                  <a:pt x="2970626" y="593247"/>
+                  <a:pt x="2988095" y="586399"/>
+                  <a:pt x="3009839" y="601743"/>
+                </a:cubicBezTo>
+                <a:cubicBezTo>
+                  <a:pt x="3046166" y="594868"/>
+                  <a:pt x="3085682" y="586046"/>
+                  <a:pt x="3115016" y="584982"/>
+                </a:cubicBezTo>
+                <a:cubicBezTo>
+                  <a:pt x="3144992" y="587935"/>
+                  <a:pt x="3158740" y="599045"/>
+                  <a:pt x="3185844" y="595356"/>
+                </a:cubicBezTo>
+                <a:cubicBezTo>
+                  <a:pt x="3209939" y="576197"/>
+                  <a:pt x="3221731" y="614583"/>
+                  <a:pt x="3246013" y="592418"/>
+                </a:cubicBezTo>
+                <a:cubicBezTo>
+                  <a:pt x="3228976" y="565486"/>
+                  <a:pt x="3320172" y="599686"/>
+                  <a:pt x="3313565" y="574138"/>
+                </a:cubicBezTo>
+                <a:cubicBezTo>
+                  <a:pt x="3341586" y="564515"/>
+                  <a:pt x="3371901" y="555346"/>
+                  <a:pt x="3414143" y="553730"/>
+                </a:cubicBezTo>
+                <a:cubicBezTo>
+                  <a:pt x="3463229" y="557630"/>
+                  <a:pt x="3476532" y="539673"/>
+                  <a:pt x="3552895" y="548563"/>
+                </a:cubicBezTo>
+                <a:cubicBezTo>
+                  <a:pt x="3620356" y="561042"/>
+                  <a:pt x="3688830" y="574962"/>
+                  <a:pt x="3753012" y="599520"/>
+                </a:cubicBezTo>
+                <a:cubicBezTo>
+                  <a:pt x="3769580" y="615048"/>
+                  <a:pt x="3777112" y="602961"/>
+                  <a:pt x="3804392" y="604131"/>
+                </a:cubicBezTo>
+                <a:cubicBezTo>
+                  <a:pt x="3831672" y="605301"/>
+                  <a:pt x="3878076" y="605222"/>
+                  <a:pt x="3916696" y="606540"/>
+                </a:cubicBezTo>
+                <a:cubicBezTo>
+                  <a:pt x="3970533" y="603881"/>
+                  <a:pt x="3981244" y="618066"/>
+                  <a:pt x="4063849" y="604058"/>
+                </a:cubicBezTo>
+                <a:cubicBezTo>
+                  <a:pt x="4074473" y="605185"/>
+                  <a:pt x="4134611" y="589365"/>
+                  <a:pt x="4172179" y="592355"/>
+                </a:cubicBezTo>
+                <a:cubicBezTo>
+                  <a:pt x="4180554" y="576172"/>
+                  <a:pt x="4255433" y="602075"/>
+                  <a:pt x="4276294" y="587119"/>
+                </a:cubicBezTo>
+                <a:cubicBezTo>
+                  <a:pt x="4326119" y="586973"/>
+                  <a:pt x="4361692" y="573867"/>
+                  <a:pt x="4411090" y="575600"/>
+                </a:cubicBezTo>
+                <a:cubicBezTo>
+                  <a:pt x="4465125" y="575500"/>
+                  <a:pt x="4518088" y="570805"/>
+                  <a:pt x="4540465" y="567464"/>
                 </a:cubicBezTo>
                 <a:lnTo>
-                  <a:pt x="60082" y="78957"/>
+                  <a:pt x="4545352" y="555554"/>
                 </a:lnTo>
                 <a:lnTo>
-                  <a:pt x="60082" y="129602"/>
+                  <a:pt x="4564014" y="553660"/>
+                </a:lnTo>
+                <a:lnTo>
+                  <a:pt x="4568602" y="550913"/>
                 </a:lnTo>
                 <a:cubicBezTo>
-                  <a:pt x="60082" y="134814"/>
-                  <a:pt x="64308" y="139039"/>
-                  <a:pt x="69520" y="139039"/>
+                  <a:pt x="4577353" y="545618"/>
+                  <a:pt x="4586105" y="540734"/>
+                  <a:pt x="4595289" y="537407"/>
                 </a:cubicBezTo>
                 <a:cubicBezTo>
-                  <a:pt x="74731" y="139039"/>
-                  <a:pt x="78957" y="134814"/>
-                  <a:pt x="78957" y="129602"/>
+                  <a:pt x="4623104" y="537511"/>
+                  <a:pt x="4660764" y="533229"/>
+                  <a:pt x="4739026" y="532483"/>
+                </a:cubicBezTo>
+                <a:cubicBezTo>
+                  <a:pt x="4806238" y="527255"/>
+                  <a:pt x="4944577" y="524439"/>
+                  <a:pt x="5061335" y="545635"/>
+                </a:cubicBezTo>
+                <a:cubicBezTo>
+                  <a:pt x="5167156" y="553533"/>
+                  <a:pt x="5251789" y="586167"/>
+                  <a:pt x="5338634" y="595754"/>
+                </a:cubicBezTo>
+                <a:cubicBezTo>
+                  <a:pt x="5415763" y="589622"/>
+                  <a:pt x="5434719" y="609365"/>
+                  <a:pt x="5529430" y="606335"/>
+                </a:cubicBezTo>
+                <a:cubicBezTo>
+                  <a:pt x="5534498" y="613561"/>
+                  <a:pt x="5597157" y="603269"/>
+                  <a:pt x="5604039" y="607676"/>
                 </a:cubicBezTo>
                 <a:lnTo>
-                  <a:pt x="78957" y="78957"/>
+                  <a:pt x="5625281" y="617253"/>
                 </a:lnTo>
                 <a:lnTo>
-                  <a:pt x="129602" y="78957"/>
+                  <a:pt x="5628138" y="615483"/>
                 </a:lnTo>
                 <a:cubicBezTo>
-                  <a:pt x="134814" y="78957"/>
-                  <a:pt x="139039" y="74731"/>
-                  <a:pt x="139039" y="69520"/>
+                  <a:pt x="5640641" y="612245"/>
+                  <a:pt x="5648217" y="613966"/>
+                  <a:pt x="5653593" y="617873"/>
+                </a:cubicBezTo>
+                <a:lnTo>
+                  <a:pt x="5658658" y="624279"/>
+                </a:lnTo>
+                <a:lnTo>
+                  <a:pt x="5675963" y="627762"/>
+                </a:lnTo>
+                <a:lnTo>
+                  <a:pt x="5709625" y="639593"/>
+                </a:lnTo>
+                <a:lnTo>
+                  <a:pt x="5716324" y="637148"/>
+                </a:lnTo>
+                <a:lnTo>
+                  <a:pt x="5767720" y="647737"/>
+                </a:lnTo>
+                <a:lnTo>
+                  <a:pt x="5768619" y="645671"/>
+                </a:lnTo>
+                <a:cubicBezTo>
+                  <a:pt x="5776130" y="642927"/>
+                  <a:pt x="5830922" y="636226"/>
+                  <a:pt x="5858696" y="628099"/>
+                </a:cubicBezTo>
+                <a:lnTo>
+                  <a:pt x="5935260" y="596904"/>
+                </a:lnTo>
+                <a:lnTo>
+                  <a:pt x="5946176" y="597874"/>
+                </a:lnTo>
+                <a:lnTo>
+                  <a:pt x="5946447" y="597396"/>
+                </a:lnTo>
+                <a:cubicBezTo>
+                  <a:pt x="5948934" y="596546"/>
+                  <a:pt x="5952567" y="596468"/>
+                  <a:pt x="5958069" y="597432"/>
+                </a:cubicBezTo>
+                <a:lnTo>
+                  <a:pt x="5966081" y="599643"/>
+                </a:lnTo>
+                <a:lnTo>
+                  <a:pt x="5987259" y="601523"/>
+                </a:lnTo>
+                <a:lnTo>
+                  <a:pt x="5994905" y="598873"/>
+                </a:lnTo>
+                <a:cubicBezTo>
+                  <a:pt x="6020610" y="579716"/>
+                  <a:pt x="6016968" y="560235"/>
+                  <a:pt x="6054803" y="541202"/>
                 </a:cubicBezTo>
                 <a:cubicBezTo>
-                  <a:pt x="139039" y="64308"/>
-                  <a:pt x="134814" y="60082"/>
-                  <a:pt x="129602" y="60082"/>
+                  <a:pt x="6108247" y="527358"/>
+                  <a:pt x="6130976" y="484538"/>
+                  <a:pt x="6188672" y="496389"/>
+                </a:cubicBezTo>
+                <a:cubicBezTo>
+                  <a:pt x="6238659" y="483279"/>
+                  <a:pt x="6277194" y="458153"/>
+                  <a:pt x="6323280" y="458013"/>
+                </a:cubicBezTo>
+                <a:cubicBezTo>
+                  <a:pt x="6368044" y="444385"/>
+                  <a:pt x="6422801" y="420428"/>
+                  <a:pt x="6457257" y="414621"/>
+                </a:cubicBezTo>
+                <a:cubicBezTo>
+                  <a:pt x="6483424" y="410645"/>
+                  <a:pt x="6508964" y="423228"/>
+                  <a:pt x="6530019" y="423168"/>
+                </a:cubicBezTo>
+                <a:cubicBezTo>
+                  <a:pt x="6558276" y="416578"/>
+                  <a:pt x="6600264" y="386690"/>
+                  <a:pt x="6626800" y="375078"/>
+                </a:cubicBezTo>
+                <a:cubicBezTo>
+                  <a:pt x="6664418" y="400828"/>
+                  <a:pt x="6655535" y="354302"/>
+                  <a:pt x="6689231" y="353501"/>
+                </a:cubicBezTo>
+                <a:cubicBezTo>
+                  <a:pt x="6708837" y="361122"/>
+                  <a:pt x="6719642" y="359485"/>
+                  <a:pt x="6726440" y="340276"/>
+                </a:cubicBezTo>
+                <a:cubicBezTo>
+                  <a:pt x="6818329" y="378763"/>
+                  <a:pt x="6765502" y="328183"/>
+                  <a:pt x="6835228" y="329393"/>
+                </a:cubicBezTo>
+                <a:cubicBezTo>
+                  <a:pt x="6897464" y="335048"/>
+                  <a:pt x="6962224" y="329085"/>
+                  <a:pt x="7039363" y="370823"/>
+                </a:cubicBezTo>
+                <a:cubicBezTo>
+                  <a:pt x="7056368" y="384567"/>
+                  <a:pt x="7070539" y="363899"/>
+                  <a:pt x="7095156" y="366075"/>
+                </a:cubicBezTo>
+                <a:cubicBezTo>
+                  <a:pt x="7119772" y="368250"/>
+                  <a:pt x="7153748" y="385714"/>
+                  <a:pt x="7187061" y="383876"/>
+                </a:cubicBezTo>
+                <a:cubicBezTo>
+                  <a:pt x="7242115" y="377604"/>
+                  <a:pt x="7270954" y="334249"/>
+                  <a:pt x="7295039" y="355046"/>
+                </a:cubicBezTo>
+                <a:cubicBezTo>
+                  <a:pt x="7320104" y="344159"/>
+                  <a:pt x="7343179" y="301443"/>
+                  <a:pt x="7373651" y="322299"/>
+                </a:cubicBezTo>
+                <a:cubicBezTo>
+                  <a:pt x="7367160" y="298575"/>
+                  <a:pt x="7410095" y="329040"/>
+                  <a:pt x="7418964" y="308685"/>
+                </a:cubicBezTo>
+                <a:cubicBezTo>
+                  <a:pt x="7424243" y="291807"/>
+                  <a:pt x="7438503" y="297117"/>
+                  <a:pt x="7450568" y="293511"/>
+                </a:cubicBezTo>
+                <a:cubicBezTo>
+                  <a:pt x="7461276" y="277652"/>
+                  <a:pt x="7519437" y="275664"/>
+                  <a:pt x="7538380" y="283235"/>
+                </a:cubicBezTo>
+                <a:cubicBezTo>
+                  <a:pt x="7594343" y="271879"/>
+                  <a:pt x="7734488" y="231676"/>
+                  <a:pt x="7786348" y="225377"/>
+                </a:cubicBezTo>
+                <a:cubicBezTo>
+                  <a:pt x="7797693" y="277094"/>
+                  <a:pt x="7847327" y="236176"/>
+                  <a:pt x="7849534" y="245434"/>
+                </a:cubicBezTo>
+                <a:cubicBezTo>
+                  <a:pt x="7894253" y="231282"/>
+                  <a:pt x="7937937" y="238796"/>
+                  <a:pt x="7981165" y="222252"/>
+                </a:cubicBezTo>
+                <a:cubicBezTo>
+                  <a:pt x="8066564" y="234459"/>
+                  <a:pt x="8127007" y="235277"/>
+                  <a:pt x="8171882" y="222497"/>
+                </a:cubicBezTo>
+                <a:cubicBezTo>
+                  <a:pt x="8183092" y="205785"/>
+                  <a:pt x="8217423" y="177145"/>
+                  <a:pt x="8242270" y="180535"/>
+                </a:cubicBezTo>
+                <a:cubicBezTo>
+                  <a:pt x="8294138" y="178846"/>
+                  <a:pt x="8410926" y="208334"/>
+                  <a:pt x="8490152" y="209193"/>
+                </a:cubicBezTo>
+                <a:cubicBezTo>
+                  <a:pt x="8558493" y="195433"/>
+                  <a:pt x="8564727" y="233466"/>
+                  <a:pt x="8622272" y="188859"/>
+                </a:cubicBezTo>
+                <a:cubicBezTo>
+                  <a:pt x="8659556" y="191317"/>
+                  <a:pt x="8666988" y="178214"/>
+                  <a:pt x="8738606" y="208945"/>
+                </a:cubicBezTo>
+                <a:cubicBezTo>
+                  <a:pt x="8769507" y="208543"/>
+                  <a:pt x="8800406" y="224019"/>
+                  <a:pt x="8831307" y="207738"/>
+                </a:cubicBezTo>
+                <a:cubicBezTo>
+                  <a:pt x="8836477" y="191612"/>
+                  <a:pt x="8870109" y="182455"/>
+                  <a:pt x="8891432" y="184510"/>
+                </a:cubicBezTo>
+                <a:cubicBezTo>
+                  <a:pt x="8876795" y="135260"/>
+                  <a:pt x="8938553" y="173381"/>
+                  <a:pt x="8946980" y="145578"/>
+                </a:cubicBezTo>
+                <a:cubicBezTo>
+                  <a:pt x="9010957" y="156064"/>
+                  <a:pt x="9046552" y="157746"/>
+                  <a:pt x="9107760" y="128052"/>
+                </a:cubicBezTo>
+                <a:cubicBezTo>
+                  <a:pt x="9135191" y="151813"/>
+                  <a:pt x="9184204" y="114911"/>
+                  <a:pt x="9195623" y="100212"/>
+                </a:cubicBezTo>
+                <a:cubicBezTo>
+                  <a:pt x="9222736" y="85917"/>
+                  <a:pt x="9230892" y="98248"/>
+                  <a:pt x="9256898" y="73900"/>
+                </a:cubicBezTo>
+                <a:cubicBezTo>
+                  <a:pt x="9276443" y="63724"/>
+                  <a:pt x="9334001" y="80454"/>
+                  <a:pt x="9351740" y="80439"/>
+                </a:cubicBezTo>
+                <a:cubicBezTo>
+                  <a:pt x="9398889" y="82633"/>
+                  <a:pt x="9473718" y="102566"/>
+                  <a:pt x="9539796" y="87069"/>
+                </a:cubicBezTo>
+                <a:cubicBezTo>
+                  <a:pt x="9565852" y="70987"/>
+                  <a:pt x="9591569" y="56211"/>
+                  <a:pt x="9619109" y="39994"/>
                 </a:cubicBezTo>
                 <a:close/>
               </a:path>
             </a:pathLst>
           </a:custGeom>
           <a:solidFill>
-            <a:schemeClr val="accent1"/>
+            <a:srgbClr val="82766A">
+              <a:alpha val="15000"/>
+            </a:srgbClr>
           </a:solidFill>
-          <a:ln w="603" cap="flat">
+          <a:ln w="12700" cap="flat" cmpd="sng" algn="ctr">
             <a:noFill/>
             <a:prstDash val="solid"/>
-            <a:miter/>
+            <a:miter lim="800000"/>
           </a:ln>
+          <a:effectLst/>
         </p:spPr>
+        <p:style>
+          <a:lnRef idx="2">
+            <a:schemeClr val="accent1">
+              <a:shade val="50000"/>
+            </a:schemeClr>
+          </a:lnRef>
+          <a:fillRef idx="1">
+            <a:schemeClr val="accent1"/>
+          </a:fillRef>
+          <a:effectRef idx="0">
+            <a:schemeClr val="accent1"/>
+          </a:effectRef>
+          <a:fontRef idx="minor">
+            <a:schemeClr val="lt1"/>
+          </a:fontRef>
+        </p:style>
         <p:txBody>
-          <a:bodyPr rtlCol="0" anchor="ctr"/>
+          <a:bodyPr wrap="square" rtlCol="0" anchor="ctr">
+            <a:noAutofit/>
+          </a:bodyPr>
           <a:lstStyle/>
           <a:p>
-            <a:endParaRPr lang="en-US"/>
+            <a:pPr algn="ctr"/>
+            <a:endParaRPr lang="en-US" dirty="0"/>
           </a:p>
         </p:txBody>
       </p:sp>
       <p:sp>
         <p:nvSpPr>
-          <p:cNvPr id="36" name="Graphic 10">
+          <p:cNvPr id="25" name="Content Placeholder 2">
             <a:extLst>
               <a:ext uri="{FF2B5EF4-FFF2-40B4-BE49-F238E27FC236}">
-                <a16:creationId xmlns:a16="http://schemas.microsoft.com/office/drawing/2014/main" id="{E3020543-B24B-4EC4-8FFC-8DD88EEA91A8}"/>
+                <a16:creationId xmlns:a16="http://schemas.microsoft.com/office/drawing/2014/main" id="{2D2A7C81-EE7C-497D-B9F8-03F828F13F67}"/>
+              </a:ext>
+            </a:extLst>
+          </p:cNvPr>
+          <p:cNvSpPr>
+            <a:spLocks noGrp="1"/>
+          </p:cNvSpPr>
+          <p:nvPr>
+            <p:ph type="subTitle" idx="1"/>
+          </p:nvPr>
+        </p:nvSpPr>
+        <p:spPr>
+          <a:xfrm>
+            <a:off x="1137035" y="2194102"/>
+            <a:ext cx="6260052" cy="3230883"/>
+          </a:xfrm>
+        </p:spPr>
+        <p:txBody>
+          <a:bodyPr vert="horz" lIns="91440" tIns="45720" rIns="91440" bIns="45720" rtlCol="0">
+            <a:normAutofit/>
+          </a:bodyPr>
+          <a:lstStyle/>
+          <a:p>
+            <a:pPr indent="-228600" algn="l">
+              <a:buFont typeface="Arial" panose="020B0604020202020204" pitchFamily="34" charset="0"/>
+              <a:buChar char="•"/>
+            </a:pPr>
+            <a:r>
+              <a:rPr lang="en-US" sz="1400"/>
+              <a:t>The current E-com could be better, that why we decided to develop this system for the next generations of our faculty.</a:t>
+            </a:r>
+          </a:p>
+          <a:p>
+            <a:pPr indent="-228600" algn="l">
+              <a:buFont typeface="Arial" panose="020B0604020202020204" pitchFamily="34" charset="0"/>
+              <a:buChar char="•"/>
+            </a:pPr>
+            <a:endParaRPr lang="en-US" sz="1400"/>
+          </a:p>
+          <a:p>
+            <a:pPr indent="-228600" algn="l">
+              <a:buFont typeface="Arial" panose="020B0604020202020204" pitchFamily="34" charset="0"/>
+              <a:buChar char="•"/>
+            </a:pPr>
+            <a:r>
+              <a:rPr lang="en-US" sz="1400"/>
+              <a:t>Developing such system is not an easy task, the E-com is a complex system with nearly unlimited number of details.</a:t>
+            </a:r>
+          </a:p>
+          <a:p>
+            <a:pPr indent="-228600" algn="l">
+              <a:buFont typeface="Arial" panose="020B0604020202020204" pitchFamily="34" charset="0"/>
+              <a:buChar char="•"/>
+            </a:pPr>
+            <a:endParaRPr lang="en-US" sz="1400"/>
+          </a:p>
+          <a:p>
+            <a:pPr indent="-228600" algn="l">
+              <a:buFont typeface="Arial" panose="020B0604020202020204" pitchFamily="34" charset="0"/>
+              <a:buChar char="•"/>
+            </a:pPr>
+            <a:r>
+              <a:rPr lang="en-US" sz="1400"/>
+              <a:t>Developing a complex system requires good management of resources and great communication between the project members.</a:t>
+            </a:r>
+          </a:p>
+          <a:p>
+            <a:pPr indent="-228600" algn="l">
+              <a:buFont typeface="Arial" panose="020B0604020202020204" pitchFamily="34" charset="0"/>
+              <a:buChar char="•"/>
+            </a:pPr>
+            <a:endParaRPr lang="en-US" sz="1400"/>
+          </a:p>
+          <a:p>
+            <a:pPr indent="-228600" algn="l">
+              <a:buFont typeface="Arial" panose="020B0604020202020204" pitchFamily="34" charset="0"/>
+              <a:buChar char="•"/>
+            </a:pPr>
+            <a:r>
+              <a:rPr lang="en-US" sz="1400"/>
+              <a:t>However, by applying the software engineering concepts that we studied throughout our journey in the faculty and with of our supervisors, we hope that we are able to do it.</a:t>
+            </a:r>
+          </a:p>
+        </p:txBody>
+      </p:sp>
+      <p:sp>
+        <p:nvSpPr>
+          <p:cNvPr id="34" name="Freeform: Shape 33">
+            <a:extLst>
+              <a:ext uri="{FF2B5EF4-FFF2-40B4-BE49-F238E27FC236}">
+                <a16:creationId xmlns:a16="http://schemas.microsoft.com/office/drawing/2014/main" id="{F3BD3BB9-3CB5-4253-A27D-6B7904723DE3}"/>
               </a:ext>
               <a:ext uri="{C183D7F6-B498-43B3-948B-1728B52AA6E4}">
                 <adec:decorative xmlns:adec="http://schemas.microsoft.com/office/drawing/2017/decorative" val="1"/>
@@ -29386,22 +30243,402 @@
         </p:nvSpPr>
         <p:spPr>
           <a:xfrm>
-            <a:off x="11236862" y="2189928"/>
-            <a:ext cx="91138" cy="91138"/>
+            <a:off x="0" y="5779827"/>
+            <a:ext cx="10680562" cy="1078174"/>
           </a:xfrm>
           <a:custGeom>
             <a:avLst/>
             <a:gdLst>
-              <a:gd name="connsiteX0" fmla="*/ 91138 w 91138"/>
-              <a:gd name="connsiteY0" fmla="*/ 45569 h 91138"/>
-              <a:gd name="connsiteX1" fmla="*/ 45569 w 91138"/>
-              <a:gd name="connsiteY1" fmla="*/ 91138 h 91138"/>
-              <a:gd name="connsiteX2" fmla="*/ 0 w 91138"/>
-              <a:gd name="connsiteY2" fmla="*/ 45569 h 91138"/>
-              <a:gd name="connsiteX3" fmla="*/ 45569 w 91138"/>
-              <a:gd name="connsiteY3" fmla="*/ 0 h 91138"/>
-              <a:gd name="connsiteX4" fmla="*/ 91138 w 91138"/>
-              <a:gd name="connsiteY4" fmla="*/ 45569 h 91138"/>
+              <a:gd name="connsiteX0" fmla="*/ 3617689 w 10680562"/>
+              <a:gd name="connsiteY0" fmla="*/ 0 h 1605023"/>
+              <a:gd name="connsiteX1" fmla="*/ 3635901 w 10680562"/>
+              <a:gd name="connsiteY1" fmla="*/ 7738 h 1605023"/>
+              <a:gd name="connsiteX2" fmla="*/ 3690891 w 10680562"/>
+              <a:gd name="connsiteY2" fmla="*/ 7049 h 1605023"/>
+              <a:gd name="connsiteX3" fmla="*/ 3832247 w 10680562"/>
+              <a:gd name="connsiteY3" fmla="*/ 13937 h 1605023"/>
+              <a:gd name="connsiteX4" fmla="*/ 3999111 w 10680562"/>
+              <a:gd name="connsiteY4" fmla="*/ 44624 h 1605023"/>
+              <a:gd name="connsiteX5" fmla="*/ 4034676 w 10680562"/>
+              <a:gd name="connsiteY5" fmla="*/ 48775 h 1605023"/>
+              <a:gd name="connsiteX6" fmla="*/ 4065394 w 10680562"/>
+              <a:gd name="connsiteY6" fmla="*/ 42879 h 1605023"/>
+              <a:gd name="connsiteX7" fmla="*/ 4072648 w 10680562"/>
+              <a:gd name="connsiteY7" fmla="*/ 33262 h 1605023"/>
+              <a:gd name="connsiteX8" fmla="*/ 4092232 w 10680562"/>
+              <a:gd name="connsiteY8" fmla="*/ 34026 h 1605023"/>
+              <a:gd name="connsiteX9" fmla="*/ 4097470 w 10680562"/>
+              <a:gd name="connsiteY9" fmla="*/ 32252 h 1605023"/>
+              <a:gd name="connsiteX10" fmla="*/ 4127488 w 10680562"/>
+              <a:gd name="connsiteY10" fmla="*/ 24056 h 1605023"/>
+              <a:gd name="connsiteX11" fmla="*/ 4190803 w 10680562"/>
+              <a:gd name="connsiteY11" fmla="*/ 55685 h 1605023"/>
+              <a:gd name="connsiteX12" fmla="*/ 4269333 w 10680562"/>
+              <a:gd name="connsiteY12" fmla="*/ 54186 h 1605023"/>
+              <a:gd name="connsiteX13" fmla="*/ 4481486 w 10680562"/>
+              <a:gd name="connsiteY13" fmla="*/ 116915 h 1605023"/>
+              <a:gd name="connsiteX14" fmla="*/ 4651418 w 10680562"/>
+              <a:gd name="connsiteY14" fmla="*/ 150071 h 1605023"/>
+              <a:gd name="connsiteX15" fmla="*/ 4863575 w 10680562"/>
+              <a:gd name="connsiteY15" fmla="*/ 175458 h 1605023"/>
+              <a:gd name="connsiteX16" fmla="*/ 5013635 w 10680562"/>
+              <a:gd name="connsiteY16" fmla="*/ 213928 h 1605023"/>
+              <a:gd name="connsiteX17" fmla="*/ 5203044 w 10680562"/>
+              <a:gd name="connsiteY17" fmla="*/ 228946 h 1605023"/>
+              <a:gd name="connsiteX18" fmla="*/ 5207070 w 10680562"/>
+              <a:gd name="connsiteY18" fmla="*/ 235105 h 1605023"/>
+              <a:gd name="connsiteX19" fmla="*/ 5224253 w 10680562"/>
+              <a:gd name="connsiteY19" fmla="*/ 240320 h 1605023"/>
+              <a:gd name="connsiteX20" fmla="*/ 5256736 w 10680562"/>
+              <a:gd name="connsiteY20" fmla="*/ 254811 h 1605023"/>
+              <a:gd name="connsiteX21" fmla="*/ 5264095 w 10680562"/>
+              <a:gd name="connsiteY21" fmla="*/ 253567 h 1605023"/>
+              <a:gd name="connsiteX22" fmla="*/ 5315084 w 10680562"/>
+              <a:gd name="connsiteY22" fmla="*/ 269264 h 1605023"/>
+              <a:gd name="connsiteX23" fmla="*/ 5316393 w 10680562"/>
+              <a:gd name="connsiteY23" fmla="*/ 267603 h 1605023"/>
+              <a:gd name="connsiteX24" fmla="*/ 5333427 w 10680562"/>
+              <a:gd name="connsiteY24" fmla="*/ 263823 h 1605023"/>
+              <a:gd name="connsiteX25" fmla="*/ 5364589 w 10680562"/>
+              <a:gd name="connsiteY25" fmla="*/ 260882 h 1605023"/>
+              <a:gd name="connsiteX26" fmla="*/ 5443973 w 10680562"/>
+              <a:gd name="connsiteY26" fmla="*/ 230866 h 1605023"/>
+              <a:gd name="connsiteX27" fmla="*/ 5497201 w 10680562"/>
+              <a:gd name="connsiteY27" fmla="*/ 247023 h 1605023"/>
+              <a:gd name="connsiteX28" fmla="*/ 5508269 w 10680562"/>
+              <a:gd name="connsiteY28" fmla="*/ 249256 h 1605023"/>
+              <a:gd name="connsiteX29" fmla="*/ 5508636 w 10680562"/>
+              <a:gd name="connsiteY29" fmla="*/ 248880 h 1605023"/>
+              <a:gd name="connsiteX30" fmla="*/ 5520606 w 10680562"/>
+              <a:gd name="connsiteY30" fmla="*/ 250400 h 1605023"/>
+              <a:gd name="connsiteX31" fmla="*/ 5528451 w 10680562"/>
+              <a:gd name="connsiteY31" fmla="*/ 253330 h 1605023"/>
+              <a:gd name="connsiteX32" fmla="*/ 5549923 w 10680562"/>
+              <a:gd name="connsiteY32" fmla="*/ 257662 h 1605023"/>
+              <a:gd name="connsiteX33" fmla="*/ 5558295 w 10680562"/>
+              <a:gd name="connsiteY33" fmla="*/ 256364 h 1605023"/>
+              <a:gd name="connsiteX34" fmla="*/ 5664799 w 10680562"/>
+              <a:gd name="connsiteY34" fmla="*/ 278924 h 1605023"/>
+              <a:gd name="connsiteX35" fmla="*/ 5796160 w 10680562"/>
+              <a:gd name="connsiteY35" fmla="*/ 307979 h 1605023"/>
+              <a:gd name="connsiteX36" fmla="*/ 5897647 w 10680562"/>
+              <a:gd name="connsiteY36" fmla="*/ 339431 h 1605023"/>
+              <a:gd name="connsiteX37" fmla="*/ 5978838 w 10680562"/>
+              <a:gd name="connsiteY37" fmla="*/ 367970 h 1605023"/>
+              <a:gd name="connsiteX38" fmla="*/ 6050367 w 10680562"/>
+              <a:gd name="connsiteY38" fmla="*/ 386341 h 1605023"/>
+              <a:gd name="connsiteX39" fmla="*/ 6140609 w 10680562"/>
+              <a:gd name="connsiteY39" fmla="*/ 385135 h 1605023"/>
+              <a:gd name="connsiteX40" fmla="*/ 6302950 w 10680562"/>
+              <a:gd name="connsiteY40" fmla="*/ 448183 h 1605023"/>
+              <a:gd name="connsiteX41" fmla="*/ 6308533 w 10680562"/>
+              <a:gd name="connsiteY41" fmla="*/ 448551 h 1605023"/>
+              <a:gd name="connsiteX42" fmla="*/ 6340278 w 10680562"/>
+              <a:gd name="connsiteY42" fmla="*/ 468555 h 1605023"/>
+              <a:gd name="connsiteX43" fmla="*/ 6341685 w 10680562"/>
+              <a:gd name="connsiteY43" fmla="*/ 467587 h 1605023"/>
+              <a:gd name="connsiteX44" fmla="*/ 6354862 w 10680562"/>
+              <a:gd name="connsiteY44" fmla="*/ 467794 h 1605023"/>
+              <a:gd name="connsiteX45" fmla="*/ 6377840 w 10680562"/>
+              <a:gd name="connsiteY45" fmla="*/ 471024 h 1605023"/>
+              <a:gd name="connsiteX46" fmla="*/ 6442804 w 10680562"/>
+              <a:gd name="connsiteY46" fmla="*/ 463091 h 1605023"/>
+              <a:gd name="connsiteX47" fmla="*/ 6476009 w 10680562"/>
+              <a:gd name="connsiteY47" fmla="*/ 483807 h 1605023"/>
+              <a:gd name="connsiteX48" fmla="*/ 6483237 w 10680562"/>
+              <a:gd name="connsiteY48" fmla="*/ 487308 h 1605023"/>
+              <a:gd name="connsiteX49" fmla="*/ 6483605 w 10680562"/>
+              <a:gd name="connsiteY49" fmla="*/ 487102 h 1605023"/>
+              <a:gd name="connsiteX50" fmla="*/ 6491673 w 10680562"/>
+              <a:gd name="connsiteY50" fmla="*/ 490243 h 1605023"/>
+              <a:gd name="connsiteX51" fmla="*/ 6496411 w 10680562"/>
+              <a:gd name="connsiteY51" fmla="*/ 493689 h 1605023"/>
+              <a:gd name="connsiteX52" fmla="*/ 6510429 w 10680562"/>
+              <a:gd name="connsiteY52" fmla="*/ 500479 h 1605023"/>
+              <a:gd name="connsiteX53" fmla="*/ 6516750 w 10680562"/>
+              <a:gd name="connsiteY53" fmla="*/ 500983 h 1605023"/>
+              <a:gd name="connsiteX54" fmla="*/ 6580199 w 10680562"/>
+              <a:gd name="connsiteY54" fmla="*/ 483318 h 1605023"/>
+              <a:gd name="connsiteX55" fmla="*/ 6690237 w 10680562"/>
+              <a:gd name="connsiteY55" fmla="*/ 493051 h 1605023"/>
+              <a:gd name="connsiteX56" fmla="*/ 6798356 w 10680562"/>
+              <a:gd name="connsiteY56" fmla="*/ 506748 h 1605023"/>
+              <a:gd name="connsiteX57" fmla="*/ 6837102 w 10680562"/>
+              <a:gd name="connsiteY57" fmla="*/ 513677 h 1605023"/>
+              <a:gd name="connsiteX58" fmla="*/ 6907934 w 10680562"/>
+              <a:gd name="connsiteY58" fmla="*/ 517339 h 1605023"/>
+              <a:gd name="connsiteX59" fmla="*/ 6941474 w 10680562"/>
+              <a:gd name="connsiteY59" fmla="*/ 513632 h 1605023"/>
+              <a:gd name="connsiteX60" fmla="*/ 6942754 w 10680562"/>
+              <a:gd name="connsiteY60" fmla="*/ 514394 h 1605023"/>
+              <a:gd name="connsiteX61" fmla="*/ 6946363 w 10680562"/>
+              <a:gd name="connsiteY61" fmla="*/ 511066 h 1605023"/>
+              <a:gd name="connsiteX62" fmla="*/ 6952592 w 10680562"/>
+              <a:gd name="connsiteY62" fmla="*/ 510252 h 1605023"/>
+              <a:gd name="connsiteX63" fmla="*/ 6968398 w 10680562"/>
+              <a:gd name="connsiteY63" fmla="*/ 513946 h 1605023"/>
+              <a:gd name="connsiteX64" fmla="*/ 6974142 w 10680562"/>
+              <a:gd name="connsiteY64" fmla="*/ 516310 h 1605023"/>
+              <a:gd name="connsiteX65" fmla="*/ 6982971 w 10680562"/>
+              <a:gd name="connsiteY65" fmla="*/ 517694 h 1605023"/>
+              <a:gd name="connsiteX66" fmla="*/ 6983252 w 10680562"/>
+              <a:gd name="connsiteY66" fmla="*/ 517416 h 1605023"/>
+              <a:gd name="connsiteX67" fmla="*/ 6991400 w 10680562"/>
+              <a:gd name="connsiteY67" fmla="*/ 519321 h 1605023"/>
+              <a:gd name="connsiteX68" fmla="*/ 7030460 w 10680562"/>
+              <a:gd name="connsiteY68" fmla="*/ 532556 h 1605023"/>
+              <a:gd name="connsiteX69" fmla="*/ 7089916 w 10680562"/>
+              <a:gd name="connsiteY69" fmla="*/ 511503 h 1605023"/>
+              <a:gd name="connsiteX70" fmla="*/ 7113059 w 10680562"/>
+              <a:gd name="connsiteY70" fmla="*/ 509904 h 1605023"/>
+              <a:gd name="connsiteX71" fmla="*/ 7125755 w 10680562"/>
+              <a:gd name="connsiteY71" fmla="*/ 507393 h 1605023"/>
+              <a:gd name="connsiteX72" fmla="*/ 7126765 w 10680562"/>
+              <a:gd name="connsiteY72" fmla="*/ 506166 h 1605023"/>
+              <a:gd name="connsiteX73" fmla="*/ 7164175 w 10680562"/>
+              <a:gd name="connsiteY73" fmla="*/ 519011 h 1605023"/>
+              <a:gd name="connsiteX74" fmla="*/ 7169654 w 10680562"/>
+              <a:gd name="connsiteY74" fmla="*/ 518219 h 1605023"/>
+              <a:gd name="connsiteX75" fmla="*/ 7193386 w 10680562"/>
+              <a:gd name="connsiteY75" fmla="*/ 529788 h 1605023"/>
+              <a:gd name="connsiteX76" fmla="*/ 7205997 w 10680562"/>
+              <a:gd name="connsiteY76" fmla="*/ 534060 h 1605023"/>
+              <a:gd name="connsiteX77" fmla="*/ 7208842 w 10680562"/>
+              <a:gd name="connsiteY77" fmla="*/ 538783 h 1605023"/>
+              <a:gd name="connsiteX78" fmla="*/ 7227817 w 10680562"/>
+              <a:gd name="connsiteY78" fmla="*/ 543304 h 1605023"/>
+              <a:gd name="connsiteX79" fmla="*/ 7230267 w 10680562"/>
+              <a:gd name="connsiteY79" fmla="*/ 542497 h 1605023"/>
+              <a:gd name="connsiteX80" fmla="*/ 7244913 w 10680562"/>
+              <a:gd name="connsiteY80" fmla="*/ 551160 h 1605023"/>
+              <a:gd name="connsiteX81" fmla="*/ 7255970 w 10680562"/>
+              <a:gd name="connsiteY81" fmla="*/ 564383 h 1605023"/>
+              <a:gd name="connsiteX82" fmla="*/ 7421156 w 10680562"/>
+              <a:gd name="connsiteY82" fmla="*/ 584155 h 1605023"/>
+              <a:gd name="connsiteX83" fmla="*/ 7553166 w 10680562"/>
+              <a:gd name="connsiteY83" fmla="*/ 653085 h 1605023"/>
+              <a:gd name="connsiteX84" fmla="*/ 7643092 w 10680562"/>
+              <a:gd name="connsiteY84" fmla="*/ 662482 h 1605023"/>
+              <a:gd name="connsiteX85" fmla="*/ 7896429 w 10680562"/>
+              <a:gd name="connsiteY85" fmla="*/ 689054 h 1605023"/>
+              <a:gd name="connsiteX86" fmla="*/ 7954620 w 10680562"/>
+              <a:gd name="connsiteY86" fmla="*/ 689481 h 1605023"/>
+              <a:gd name="connsiteX87" fmla="*/ 8000803 w 10680562"/>
+              <a:gd name="connsiteY87" fmla="*/ 714583 h 1605023"/>
+              <a:gd name="connsiteX88" fmla="*/ 8023216 w 10680562"/>
+              <a:gd name="connsiteY88" fmla="*/ 709000 h 1605023"/>
+              <a:gd name="connsiteX89" fmla="*/ 8027136 w 10680562"/>
+              <a:gd name="connsiteY89" fmla="*/ 707765 h 1605023"/>
+              <a:gd name="connsiteX90" fmla="*/ 8041622 w 10680562"/>
+              <a:gd name="connsiteY90" fmla="*/ 708731 h 1605023"/>
+              <a:gd name="connsiteX91" fmla="*/ 8047209 w 10680562"/>
+              <a:gd name="connsiteY91" fmla="*/ 701624 h 1605023"/>
+              <a:gd name="connsiteX92" fmla="*/ 8070088 w 10680562"/>
+              <a:gd name="connsiteY92" fmla="*/ 697789 h 1605023"/>
+              <a:gd name="connsiteX93" fmla="*/ 8096332 w 10680562"/>
+              <a:gd name="connsiteY93" fmla="*/ 701624 h 1605023"/>
+              <a:gd name="connsiteX94" fmla="*/ 8219225 w 10680562"/>
+              <a:gd name="connsiteY94" fmla="*/ 728069 h 1605023"/>
+              <a:gd name="connsiteX95" fmla="*/ 8293793 w 10680562"/>
+              <a:gd name="connsiteY95" fmla="*/ 739200 h 1605023"/>
+              <a:gd name="connsiteX96" fmla="*/ 8323753 w 10680562"/>
+              <a:gd name="connsiteY96" fmla="*/ 736063 h 1605023"/>
+              <a:gd name="connsiteX97" fmla="*/ 8364496 w 10680562"/>
+              <a:gd name="connsiteY97" fmla="*/ 736635 h 1605023"/>
+              <a:gd name="connsiteX98" fmla="*/ 8437662 w 10680562"/>
+              <a:gd name="connsiteY98" fmla="*/ 731942 h 1605023"/>
+              <a:gd name="connsiteX99" fmla="*/ 8533764 w 10680562"/>
+              <a:gd name="connsiteY99" fmla="*/ 735554 h 1605023"/>
+              <a:gd name="connsiteX100" fmla="*/ 8596769 w 10680562"/>
+              <a:gd name="connsiteY100" fmla="*/ 769632 h 1605023"/>
+              <a:gd name="connsiteX101" fmla="*/ 8604035 w 10680562"/>
+              <a:gd name="connsiteY101" fmla="*/ 764982 h 1605023"/>
+              <a:gd name="connsiteX102" fmla="*/ 8650929 w 10680562"/>
+              <a:gd name="connsiteY102" fmla="*/ 773164 h 1605023"/>
+              <a:gd name="connsiteX103" fmla="*/ 8806497 w 10680562"/>
+              <a:gd name="connsiteY103" fmla="*/ 839707 h 1605023"/>
+              <a:gd name="connsiteX104" fmla="*/ 8898377 w 10680562"/>
+              <a:gd name="connsiteY104" fmla="*/ 854651 h 1605023"/>
+              <a:gd name="connsiteX105" fmla="*/ 8932389 w 10680562"/>
+              <a:gd name="connsiteY105" fmla="*/ 853846 h 1605023"/>
+              <a:gd name="connsiteX106" fmla="*/ 8989288 w 10680562"/>
+              <a:gd name="connsiteY106" fmla="*/ 852877 h 1605023"/>
+              <a:gd name="connsiteX107" fmla="*/ 9035275 w 10680562"/>
+              <a:gd name="connsiteY107" fmla="*/ 837110 h 1605023"/>
+              <a:gd name="connsiteX108" fmla="*/ 9138626 w 10680562"/>
+              <a:gd name="connsiteY108" fmla="*/ 862106 h 1605023"/>
+              <a:gd name="connsiteX109" fmla="*/ 9216298 w 10680562"/>
+              <a:gd name="connsiteY109" fmla="*/ 858754 h 1605023"/>
+              <a:gd name="connsiteX110" fmla="*/ 9259941 w 10680562"/>
+              <a:gd name="connsiteY110" fmla="*/ 861843 h 1605023"/>
+              <a:gd name="connsiteX111" fmla="*/ 9380407 w 10680562"/>
+              <a:gd name="connsiteY111" fmla="*/ 864825 h 1605023"/>
+              <a:gd name="connsiteX112" fmla="*/ 9490772 w 10680562"/>
+              <a:gd name="connsiteY112" fmla="*/ 901190 h 1605023"/>
+              <a:gd name="connsiteX113" fmla="*/ 9584982 w 10680562"/>
+              <a:gd name="connsiteY113" fmla="*/ 935980 h 1605023"/>
+              <a:gd name="connsiteX114" fmla="*/ 9759797 w 10680562"/>
+              <a:gd name="connsiteY114" fmla="*/ 1010923 h 1605023"/>
+              <a:gd name="connsiteX115" fmla="*/ 9834455 w 10680562"/>
+              <a:gd name="connsiteY115" fmla="*/ 1082908 h 1605023"/>
+              <a:gd name="connsiteX116" fmla="*/ 9939504 w 10680562"/>
+              <a:gd name="connsiteY116" fmla="*/ 1110614 h 1605023"/>
+              <a:gd name="connsiteX117" fmla="*/ 10077001 w 10680562"/>
+              <a:gd name="connsiteY117" fmla="*/ 1160906 h 1605023"/>
+              <a:gd name="connsiteX118" fmla="*/ 10178431 w 10680562"/>
+              <a:gd name="connsiteY118" fmla="*/ 1244920 h 1605023"/>
+              <a:gd name="connsiteX119" fmla="*/ 10248658 w 10680562"/>
+              <a:gd name="connsiteY119" fmla="*/ 1309335 h 1605023"/>
+              <a:gd name="connsiteX120" fmla="*/ 10414709 w 10680562"/>
+              <a:gd name="connsiteY120" fmla="*/ 1388645 h 1605023"/>
+              <a:gd name="connsiteX121" fmla="*/ 10592469 w 10680562"/>
+              <a:gd name="connsiteY121" fmla="*/ 1543828 h 1605023"/>
+              <a:gd name="connsiteX122" fmla="*/ 10674941 w 10680562"/>
+              <a:gd name="connsiteY122" fmla="*/ 1597388 h 1605023"/>
+              <a:gd name="connsiteX123" fmla="*/ 10680562 w 10680562"/>
+              <a:gd name="connsiteY123" fmla="*/ 1605023 h 1605023"/>
+              <a:gd name="connsiteX124" fmla="*/ 0 w 10680562"/>
+              <a:gd name="connsiteY124" fmla="*/ 1605023 h 1605023"/>
+              <a:gd name="connsiteX125" fmla="*/ 0 w 10680562"/>
+              <a:gd name="connsiteY125" fmla="*/ 415048 h 1605023"/>
+              <a:gd name="connsiteX126" fmla="*/ 9656 w 10680562"/>
+              <a:gd name="connsiteY126" fmla="*/ 416044 h 1605023"/>
+              <a:gd name="connsiteX127" fmla="*/ 179196 w 10680562"/>
+              <a:gd name="connsiteY127" fmla="*/ 423071 h 1605023"/>
+              <a:gd name="connsiteX128" fmla="*/ 250912 w 10680562"/>
+              <a:gd name="connsiteY128" fmla="*/ 408617 h 1605023"/>
+              <a:gd name="connsiteX129" fmla="*/ 291375 w 10680562"/>
+              <a:gd name="connsiteY129" fmla="*/ 403710 h 1605023"/>
+              <a:gd name="connsiteX130" fmla="*/ 320542 w 10680562"/>
+              <a:gd name="connsiteY130" fmla="*/ 396592 h 1605023"/>
+              <a:gd name="connsiteX131" fmla="*/ 522426 w 10680562"/>
+              <a:gd name="connsiteY131" fmla="*/ 407158 h 1605023"/>
+              <a:gd name="connsiteX132" fmla="*/ 549068 w 10680562"/>
+              <a:gd name="connsiteY132" fmla="*/ 407418 h 1605023"/>
+              <a:gd name="connsiteX133" fmla="*/ 571100 w 10680562"/>
+              <a:gd name="connsiteY133" fmla="*/ 400562 h 1605023"/>
+              <a:gd name="connsiteX134" fmla="*/ 575457 w 10680562"/>
+              <a:gd name="connsiteY134" fmla="*/ 392801 h 1605023"/>
+              <a:gd name="connsiteX135" fmla="*/ 589968 w 10680562"/>
+              <a:gd name="connsiteY135" fmla="*/ 391807 h 1605023"/>
+              <a:gd name="connsiteX136" fmla="*/ 593649 w 10680562"/>
+              <a:gd name="connsiteY136" fmla="*/ 390062 h 1605023"/>
+              <a:gd name="connsiteX137" fmla="*/ 614928 w 10680562"/>
+              <a:gd name="connsiteY137" fmla="*/ 381544 h 1605023"/>
+              <a:gd name="connsiteX138" fmla="*/ 722580 w 10680562"/>
+              <a:gd name="connsiteY138" fmla="*/ 392722 h 1605023"/>
+              <a:gd name="connsiteX139" fmla="*/ 946884 w 10680562"/>
+              <a:gd name="connsiteY139" fmla="*/ 411854 h 1605023"/>
+              <a:gd name="connsiteX140" fmla="*/ 1210905 w 10680562"/>
+              <a:gd name="connsiteY140" fmla="*/ 432414 h 1605023"/>
+              <a:gd name="connsiteX141" fmla="*/ 1377854 w 10680562"/>
+              <a:gd name="connsiteY141" fmla="*/ 429745 h 1605023"/>
+              <a:gd name="connsiteX142" fmla="*/ 1391004 w 10680562"/>
+              <a:gd name="connsiteY142" fmla="*/ 441307 h 1605023"/>
+              <a:gd name="connsiteX143" fmla="*/ 1406953 w 10680562"/>
+              <a:gd name="connsiteY143" fmla="*/ 447889 h 1605023"/>
+              <a:gd name="connsiteX144" fmla="*/ 1409246 w 10680562"/>
+              <a:gd name="connsiteY144" fmla="*/ 446765 h 1605023"/>
+              <a:gd name="connsiteX145" fmla="*/ 1428800 w 10680562"/>
+              <a:gd name="connsiteY145" fmla="*/ 448677 h 1605023"/>
+              <a:gd name="connsiteX146" fmla="*/ 1432402 w 10680562"/>
+              <a:gd name="connsiteY146" fmla="*/ 452956 h 1605023"/>
+              <a:gd name="connsiteX147" fmla="*/ 1606578 w 10680562"/>
+              <a:gd name="connsiteY147" fmla="*/ 430870 h 1605023"/>
+              <a:gd name="connsiteX148" fmla="*/ 1647476 w 10680562"/>
+              <a:gd name="connsiteY148" fmla="*/ 438687 h 1605023"/>
+              <a:gd name="connsiteX149" fmla="*/ 1655866 w 10680562"/>
+              <a:gd name="connsiteY149" fmla="*/ 439472 h 1605023"/>
+              <a:gd name="connsiteX150" fmla="*/ 1656096 w 10680562"/>
+              <a:gd name="connsiteY150" fmla="*/ 439162 h 1605023"/>
+              <a:gd name="connsiteX151" fmla="*/ 1670708 w 10680562"/>
+              <a:gd name="connsiteY151" fmla="*/ 412530 h 1605023"/>
+              <a:gd name="connsiteX152" fmla="*/ 1737953 w 10680562"/>
+              <a:gd name="connsiteY152" fmla="*/ 399496 h 1605023"/>
+              <a:gd name="connsiteX153" fmla="*/ 1848192 w 10680562"/>
+              <a:gd name="connsiteY153" fmla="*/ 376032 h 1605023"/>
+              <a:gd name="connsiteX154" fmla="*/ 1954077 w 10680562"/>
+              <a:gd name="connsiteY154" fmla="*/ 352621 h 1605023"/>
+              <a:gd name="connsiteX155" fmla="*/ 1993047 w 10680562"/>
+              <a:gd name="connsiteY155" fmla="*/ 346068 h 1605023"/>
+              <a:gd name="connsiteX156" fmla="*/ 2059719 w 10680562"/>
+              <a:gd name="connsiteY156" fmla="*/ 325903 h 1605023"/>
+              <a:gd name="connsiteX157" fmla="*/ 2088528 w 10680562"/>
+              <a:gd name="connsiteY157" fmla="*/ 311409 h 1605023"/>
+              <a:gd name="connsiteX158" fmla="*/ 2090087 w 10680562"/>
+              <a:gd name="connsiteY158" fmla="*/ 311676 h 1605023"/>
+              <a:gd name="connsiteX159" fmla="*/ 2091700 w 10680562"/>
+              <a:gd name="connsiteY159" fmla="*/ 307455 h 1605023"/>
+              <a:gd name="connsiteX160" fmla="*/ 2096989 w 10680562"/>
+              <a:gd name="connsiteY160" fmla="*/ 304649 h 1605023"/>
+              <a:gd name="connsiteX161" fmla="*/ 2113325 w 10680562"/>
+              <a:gd name="connsiteY161" fmla="*/ 302764 h 1605023"/>
+              <a:gd name="connsiteX162" fmla="*/ 2119780 w 10680562"/>
+              <a:gd name="connsiteY162" fmla="*/ 303007 h 1605023"/>
+              <a:gd name="connsiteX163" fmla="*/ 2128562 w 10680562"/>
+              <a:gd name="connsiteY163" fmla="*/ 301336 h 1605023"/>
+              <a:gd name="connsiteX164" fmla="*/ 2128679 w 10680562"/>
+              <a:gd name="connsiteY164" fmla="*/ 300991 h 1605023"/>
+              <a:gd name="connsiteX165" fmla="*/ 2179558 w 10680562"/>
+              <a:gd name="connsiteY165" fmla="*/ 299095 h 1605023"/>
+              <a:gd name="connsiteX166" fmla="*/ 2223277 w 10680562"/>
+              <a:gd name="connsiteY166" fmla="*/ 260239 h 1605023"/>
+              <a:gd name="connsiteX167" fmla="*/ 2243644 w 10680562"/>
+              <a:gd name="connsiteY167" fmla="*/ 251110 h 1605023"/>
+              <a:gd name="connsiteX168" fmla="*/ 2253986 w 10680562"/>
+              <a:gd name="connsiteY168" fmla="*/ 244616 h 1605023"/>
+              <a:gd name="connsiteX169" fmla="*/ 2254285 w 10680562"/>
+              <a:gd name="connsiteY169" fmla="*/ 243167 h 1605023"/>
+              <a:gd name="connsiteX170" fmla="*/ 2295037 w 10680562"/>
+              <a:gd name="connsiteY170" fmla="*/ 242433 h 1605023"/>
+              <a:gd name="connsiteX171" fmla="*/ 2299648 w 10680562"/>
+              <a:gd name="connsiteY171" fmla="*/ 239896 h 1605023"/>
+              <a:gd name="connsiteX172" fmla="*/ 2327237 w 10680562"/>
+              <a:gd name="connsiteY172" fmla="*/ 242539 h 1605023"/>
+              <a:gd name="connsiteX173" fmla="*/ 2340943 w 10680562"/>
+              <a:gd name="connsiteY173" fmla="*/ 242239 h 1605023"/>
+              <a:gd name="connsiteX174" fmla="*/ 2345943 w 10680562"/>
+              <a:gd name="connsiteY174" fmla="*/ 245589 h 1605023"/>
+              <a:gd name="connsiteX175" fmla="*/ 2365602 w 10680562"/>
+              <a:gd name="connsiteY175" fmla="*/ 243403 h 1605023"/>
+              <a:gd name="connsiteX176" fmla="*/ 2367433 w 10680562"/>
+              <a:gd name="connsiteY176" fmla="*/ 241858 h 1605023"/>
+              <a:gd name="connsiteX177" fmla="*/ 2385231 w 10680562"/>
+              <a:gd name="connsiteY177" fmla="*/ 244873 h 1605023"/>
+              <a:gd name="connsiteX178" fmla="*/ 2402059 w 10680562"/>
+              <a:gd name="connsiteY178" fmla="*/ 253223 h 1605023"/>
+              <a:gd name="connsiteX179" fmla="*/ 2719020 w 10680562"/>
+              <a:gd name="connsiteY179" fmla="*/ 235271 h 1605023"/>
+              <a:gd name="connsiteX180" fmla="*/ 2877308 w 10680562"/>
+              <a:gd name="connsiteY180" fmla="*/ 208630 h 1605023"/>
+              <a:gd name="connsiteX181" fmla="*/ 3051375 w 10680562"/>
+              <a:gd name="connsiteY181" fmla="*/ 154110 h 1605023"/>
+              <a:gd name="connsiteX182" fmla="*/ 3104837 w 10680562"/>
+              <a:gd name="connsiteY182" fmla="*/ 135199 h 1605023"/>
+              <a:gd name="connsiteX183" fmla="*/ 3159836 w 10680562"/>
+              <a:gd name="connsiteY183" fmla="*/ 142694 h 1605023"/>
+              <a:gd name="connsiteX184" fmla="*/ 3177510 w 10680562"/>
+              <a:gd name="connsiteY184" fmla="*/ 130186 h 1605023"/>
+              <a:gd name="connsiteX185" fmla="*/ 3180470 w 10680562"/>
+              <a:gd name="connsiteY185" fmla="*/ 127764 h 1605023"/>
+              <a:gd name="connsiteX186" fmla="*/ 3194216 w 10680562"/>
+              <a:gd name="connsiteY186" fmla="*/ 123837 h 1605023"/>
+              <a:gd name="connsiteX187" fmla="*/ 3214710 w 10680562"/>
+              <a:gd name="connsiteY187" fmla="*/ 104451 h 1605023"/>
+              <a:gd name="connsiteX188" fmla="*/ 3240671 w 10680562"/>
+              <a:gd name="connsiteY188" fmla="*/ 99232 h 1605023"/>
+              <a:gd name="connsiteX189" fmla="*/ 3366544 w 10680562"/>
+              <a:gd name="connsiteY189" fmla="*/ 82506 h 1605023"/>
+              <a:gd name="connsiteX190" fmla="*/ 3440424 w 10680562"/>
+              <a:gd name="connsiteY190" fmla="*/ 67891 h 1605023"/>
+              <a:gd name="connsiteX191" fmla="*/ 3466248 w 10680562"/>
+              <a:gd name="connsiteY191" fmla="*/ 55103 h 1605023"/>
+              <a:gd name="connsiteX192" fmla="*/ 3503820 w 10680562"/>
+              <a:gd name="connsiteY192" fmla="*/ 42110 h 1605023"/>
+              <a:gd name="connsiteX193" fmla="*/ 3568389 w 10680562"/>
+              <a:gd name="connsiteY193" fmla="*/ 13576 h 1605023"/>
+              <a:gd name="connsiteX194" fmla="*/ 3604089 w 10680562"/>
+              <a:gd name="connsiteY194" fmla="*/ 6980 h 1605023"/>
             </a:gdLst>
             <a:ahLst/>
             <a:cxnLst>
@@ -29420,54 +30657,1465 @@
               <a:cxn ang="0">
                 <a:pos x="connsiteX4" y="connsiteY4"/>
               </a:cxn>
+              <a:cxn ang="0">
+                <a:pos x="connsiteX5" y="connsiteY5"/>
+              </a:cxn>
+              <a:cxn ang="0">
+                <a:pos x="connsiteX6" y="connsiteY6"/>
+              </a:cxn>
+              <a:cxn ang="0">
+                <a:pos x="connsiteX7" y="connsiteY7"/>
+              </a:cxn>
+              <a:cxn ang="0">
+                <a:pos x="connsiteX8" y="connsiteY8"/>
+              </a:cxn>
+              <a:cxn ang="0">
+                <a:pos x="connsiteX9" y="connsiteY9"/>
+              </a:cxn>
+              <a:cxn ang="0">
+                <a:pos x="connsiteX10" y="connsiteY10"/>
+              </a:cxn>
+              <a:cxn ang="0">
+                <a:pos x="connsiteX11" y="connsiteY11"/>
+              </a:cxn>
+              <a:cxn ang="0">
+                <a:pos x="connsiteX12" y="connsiteY12"/>
+              </a:cxn>
+              <a:cxn ang="0">
+                <a:pos x="connsiteX13" y="connsiteY13"/>
+              </a:cxn>
+              <a:cxn ang="0">
+                <a:pos x="connsiteX14" y="connsiteY14"/>
+              </a:cxn>
+              <a:cxn ang="0">
+                <a:pos x="connsiteX15" y="connsiteY15"/>
+              </a:cxn>
+              <a:cxn ang="0">
+                <a:pos x="connsiteX16" y="connsiteY16"/>
+              </a:cxn>
+              <a:cxn ang="0">
+                <a:pos x="connsiteX17" y="connsiteY17"/>
+              </a:cxn>
+              <a:cxn ang="0">
+                <a:pos x="connsiteX18" y="connsiteY18"/>
+              </a:cxn>
+              <a:cxn ang="0">
+                <a:pos x="connsiteX19" y="connsiteY19"/>
+              </a:cxn>
+              <a:cxn ang="0">
+                <a:pos x="connsiteX20" y="connsiteY20"/>
+              </a:cxn>
+              <a:cxn ang="0">
+                <a:pos x="connsiteX21" y="connsiteY21"/>
+              </a:cxn>
+              <a:cxn ang="0">
+                <a:pos x="connsiteX22" y="connsiteY22"/>
+              </a:cxn>
+              <a:cxn ang="0">
+                <a:pos x="connsiteX23" y="connsiteY23"/>
+              </a:cxn>
+              <a:cxn ang="0">
+                <a:pos x="connsiteX24" y="connsiteY24"/>
+              </a:cxn>
+              <a:cxn ang="0">
+                <a:pos x="connsiteX25" y="connsiteY25"/>
+              </a:cxn>
+              <a:cxn ang="0">
+                <a:pos x="connsiteX26" y="connsiteY26"/>
+              </a:cxn>
+              <a:cxn ang="0">
+                <a:pos x="connsiteX27" y="connsiteY27"/>
+              </a:cxn>
+              <a:cxn ang="0">
+                <a:pos x="connsiteX28" y="connsiteY28"/>
+              </a:cxn>
+              <a:cxn ang="0">
+                <a:pos x="connsiteX29" y="connsiteY29"/>
+              </a:cxn>
+              <a:cxn ang="0">
+                <a:pos x="connsiteX30" y="connsiteY30"/>
+              </a:cxn>
+              <a:cxn ang="0">
+                <a:pos x="connsiteX31" y="connsiteY31"/>
+              </a:cxn>
+              <a:cxn ang="0">
+                <a:pos x="connsiteX32" y="connsiteY32"/>
+              </a:cxn>
+              <a:cxn ang="0">
+                <a:pos x="connsiteX33" y="connsiteY33"/>
+              </a:cxn>
+              <a:cxn ang="0">
+                <a:pos x="connsiteX34" y="connsiteY34"/>
+              </a:cxn>
+              <a:cxn ang="0">
+                <a:pos x="connsiteX35" y="connsiteY35"/>
+              </a:cxn>
+              <a:cxn ang="0">
+                <a:pos x="connsiteX36" y="connsiteY36"/>
+              </a:cxn>
+              <a:cxn ang="0">
+                <a:pos x="connsiteX37" y="connsiteY37"/>
+              </a:cxn>
+              <a:cxn ang="0">
+                <a:pos x="connsiteX38" y="connsiteY38"/>
+              </a:cxn>
+              <a:cxn ang="0">
+                <a:pos x="connsiteX39" y="connsiteY39"/>
+              </a:cxn>
+              <a:cxn ang="0">
+                <a:pos x="connsiteX40" y="connsiteY40"/>
+              </a:cxn>
+              <a:cxn ang="0">
+                <a:pos x="connsiteX41" y="connsiteY41"/>
+              </a:cxn>
+              <a:cxn ang="0">
+                <a:pos x="connsiteX42" y="connsiteY42"/>
+              </a:cxn>
+              <a:cxn ang="0">
+                <a:pos x="connsiteX43" y="connsiteY43"/>
+              </a:cxn>
+              <a:cxn ang="0">
+                <a:pos x="connsiteX44" y="connsiteY44"/>
+              </a:cxn>
+              <a:cxn ang="0">
+                <a:pos x="connsiteX45" y="connsiteY45"/>
+              </a:cxn>
+              <a:cxn ang="0">
+                <a:pos x="connsiteX46" y="connsiteY46"/>
+              </a:cxn>
+              <a:cxn ang="0">
+                <a:pos x="connsiteX47" y="connsiteY47"/>
+              </a:cxn>
+              <a:cxn ang="0">
+                <a:pos x="connsiteX48" y="connsiteY48"/>
+              </a:cxn>
+              <a:cxn ang="0">
+                <a:pos x="connsiteX49" y="connsiteY49"/>
+              </a:cxn>
+              <a:cxn ang="0">
+                <a:pos x="connsiteX50" y="connsiteY50"/>
+              </a:cxn>
+              <a:cxn ang="0">
+                <a:pos x="connsiteX51" y="connsiteY51"/>
+              </a:cxn>
+              <a:cxn ang="0">
+                <a:pos x="connsiteX52" y="connsiteY52"/>
+              </a:cxn>
+              <a:cxn ang="0">
+                <a:pos x="connsiteX53" y="connsiteY53"/>
+              </a:cxn>
+              <a:cxn ang="0">
+                <a:pos x="connsiteX54" y="connsiteY54"/>
+              </a:cxn>
+              <a:cxn ang="0">
+                <a:pos x="connsiteX55" y="connsiteY55"/>
+              </a:cxn>
+              <a:cxn ang="0">
+                <a:pos x="connsiteX56" y="connsiteY56"/>
+              </a:cxn>
+              <a:cxn ang="0">
+                <a:pos x="connsiteX57" y="connsiteY57"/>
+              </a:cxn>
+              <a:cxn ang="0">
+                <a:pos x="connsiteX58" y="connsiteY58"/>
+              </a:cxn>
+              <a:cxn ang="0">
+                <a:pos x="connsiteX59" y="connsiteY59"/>
+              </a:cxn>
+              <a:cxn ang="0">
+                <a:pos x="connsiteX60" y="connsiteY60"/>
+              </a:cxn>
+              <a:cxn ang="0">
+                <a:pos x="connsiteX61" y="connsiteY61"/>
+              </a:cxn>
+              <a:cxn ang="0">
+                <a:pos x="connsiteX62" y="connsiteY62"/>
+              </a:cxn>
+              <a:cxn ang="0">
+                <a:pos x="connsiteX63" y="connsiteY63"/>
+              </a:cxn>
+              <a:cxn ang="0">
+                <a:pos x="connsiteX64" y="connsiteY64"/>
+              </a:cxn>
+              <a:cxn ang="0">
+                <a:pos x="connsiteX65" y="connsiteY65"/>
+              </a:cxn>
+              <a:cxn ang="0">
+                <a:pos x="connsiteX66" y="connsiteY66"/>
+              </a:cxn>
+              <a:cxn ang="0">
+                <a:pos x="connsiteX67" y="connsiteY67"/>
+              </a:cxn>
+              <a:cxn ang="0">
+                <a:pos x="connsiteX68" y="connsiteY68"/>
+              </a:cxn>
+              <a:cxn ang="0">
+                <a:pos x="connsiteX69" y="connsiteY69"/>
+              </a:cxn>
+              <a:cxn ang="0">
+                <a:pos x="connsiteX70" y="connsiteY70"/>
+              </a:cxn>
+              <a:cxn ang="0">
+                <a:pos x="connsiteX71" y="connsiteY71"/>
+              </a:cxn>
+              <a:cxn ang="0">
+                <a:pos x="connsiteX72" y="connsiteY72"/>
+              </a:cxn>
+              <a:cxn ang="0">
+                <a:pos x="connsiteX73" y="connsiteY73"/>
+              </a:cxn>
+              <a:cxn ang="0">
+                <a:pos x="connsiteX74" y="connsiteY74"/>
+              </a:cxn>
+              <a:cxn ang="0">
+                <a:pos x="connsiteX75" y="connsiteY75"/>
+              </a:cxn>
+              <a:cxn ang="0">
+                <a:pos x="connsiteX76" y="connsiteY76"/>
+              </a:cxn>
+              <a:cxn ang="0">
+                <a:pos x="connsiteX77" y="connsiteY77"/>
+              </a:cxn>
+              <a:cxn ang="0">
+                <a:pos x="connsiteX78" y="connsiteY78"/>
+              </a:cxn>
+              <a:cxn ang="0">
+                <a:pos x="connsiteX79" y="connsiteY79"/>
+              </a:cxn>
+              <a:cxn ang="0">
+                <a:pos x="connsiteX80" y="connsiteY80"/>
+              </a:cxn>
+              <a:cxn ang="0">
+                <a:pos x="connsiteX81" y="connsiteY81"/>
+              </a:cxn>
+              <a:cxn ang="0">
+                <a:pos x="connsiteX82" y="connsiteY82"/>
+              </a:cxn>
+              <a:cxn ang="0">
+                <a:pos x="connsiteX83" y="connsiteY83"/>
+              </a:cxn>
+              <a:cxn ang="0">
+                <a:pos x="connsiteX84" y="connsiteY84"/>
+              </a:cxn>
+              <a:cxn ang="0">
+                <a:pos x="connsiteX85" y="connsiteY85"/>
+              </a:cxn>
+              <a:cxn ang="0">
+                <a:pos x="connsiteX86" y="connsiteY86"/>
+              </a:cxn>
+              <a:cxn ang="0">
+                <a:pos x="connsiteX87" y="connsiteY87"/>
+              </a:cxn>
+              <a:cxn ang="0">
+                <a:pos x="connsiteX88" y="connsiteY88"/>
+              </a:cxn>
+              <a:cxn ang="0">
+                <a:pos x="connsiteX89" y="connsiteY89"/>
+              </a:cxn>
+              <a:cxn ang="0">
+                <a:pos x="connsiteX90" y="connsiteY90"/>
+              </a:cxn>
+              <a:cxn ang="0">
+                <a:pos x="connsiteX91" y="connsiteY91"/>
+              </a:cxn>
+              <a:cxn ang="0">
+                <a:pos x="connsiteX92" y="connsiteY92"/>
+              </a:cxn>
+              <a:cxn ang="0">
+                <a:pos x="connsiteX93" y="connsiteY93"/>
+              </a:cxn>
+              <a:cxn ang="0">
+                <a:pos x="connsiteX94" y="connsiteY94"/>
+              </a:cxn>
+              <a:cxn ang="0">
+                <a:pos x="connsiteX95" y="connsiteY95"/>
+              </a:cxn>
+              <a:cxn ang="0">
+                <a:pos x="connsiteX96" y="connsiteY96"/>
+              </a:cxn>
+              <a:cxn ang="0">
+                <a:pos x="connsiteX97" y="connsiteY97"/>
+              </a:cxn>
+              <a:cxn ang="0">
+                <a:pos x="connsiteX98" y="connsiteY98"/>
+              </a:cxn>
+              <a:cxn ang="0">
+                <a:pos x="connsiteX99" y="connsiteY99"/>
+              </a:cxn>
+              <a:cxn ang="0">
+                <a:pos x="connsiteX100" y="connsiteY100"/>
+              </a:cxn>
+              <a:cxn ang="0">
+                <a:pos x="connsiteX101" y="connsiteY101"/>
+              </a:cxn>
+              <a:cxn ang="0">
+                <a:pos x="connsiteX102" y="connsiteY102"/>
+              </a:cxn>
+              <a:cxn ang="0">
+                <a:pos x="connsiteX103" y="connsiteY103"/>
+              </a:cxn>
+              <a:cxn ang="0">
+                <a:pos x="connsiteX104" y="connsiteY104"/>
+              </a:cxn>
+              <a:cxn ang="0">
+                <a:pos x="connsiteX105" y="connsiteY105"/>
+              </a:cxn>
+              <a:cxn ang="0">
+                <a:pos x="connsiteX106" y="connsiteY106"/>
+              </a:cxn>
+              <a:cxn ang="0">
+                <a:pos x="connsiteX107" y="connsiteY107"/>
+              </a:cxn>
+              <a:cxn ang="0">
+                <a:pos x="connsiteX108" y="connsiteY108"/>
+              </a:cxn>
+              <a:cxn ang="0">
+                <a:pos x="connsiteX109" y="connsiteY109"/>
+              </a:cxn>
+              <a:cxn ang="0">
+                <a:pos x="connsiteX110" y="connsiteY110"/>
+              </a:cxn>
+              <a:cxn ang="0">
+                <a:pos x="connsiteX111" y="connsiteY111"/>
+              </a:cxn>
+              <a:cxn ang="0">
+                <a:pos x="connsiteX112" y="connsiteY112"/>
+              </a:cxn>
+              <a:cxn ang="0">
+                <a:pos x="connsiteX113" y="connsiteY113"/>
+              </a:cxn>
+              <a:cxn ang="0">
+                <a:pos x="connsiteX114" y="connsiteY114"/>
+              </a:cxn>
+              <a:cxn ang="0">
+                <a:pos x="connsiteX115" y="connsiteY115"/>
+              </a:cxn>
+              <a:cxn ang="0">
+                <a:pos x="connsiteX116" y="connsiteY116"/>
+              </a:cxn>
+              <a:cxn ang="0">
+                <a:pos x="connsiteX117" y="connsiteY117"/>
+              </a:cxn>
+              <a:cxn ang="0">
+                <a:pos x="connsiteX118" y="connsiteY118"/>
+              </a:cxn>
+              <a:cxn ang="0">
+                <a:pos x="connsiteX119" y="connsiteY119"/>
+              </a:cxn>
+              <a:cxn ang="0">
+                <a:pos x="connsiteX120" y="connsiteY120"/>
+              </a:cxn>
+              <a:cxn ang="0">
+                <a:pos x="connsiteX121" y="connsiteY121"/>
+              </a:cxn>
+              <a:cxn ang="0">
+                <a:pos x="connsiteX122" y="connsiteY122"/>
+              </a:cxn>
+              <a:cxn ang="0">
+                <a:pos x="connsiteX123" y="connsiteY123"/>
+              </a:cxn>
+              <a:cxn ang="0">
+                <a:pos x="connsiteX124" y="connsiteY124"/>
+              </a:cxn>
+              <a:cxn ang="0">
+                <a:pos x="connsiteX125" y="connsiteY125"/>
+              </a:cxn>
+              <a:cxn ang="0">
+                <a:pos x="connsiteX126" y="connsiteY126"/>
+              </a:cxn>
+              <a:cxn ang="0">
+                <a:pos x="connsiteX127" y="connsiteY127"/>
+              </a:cxn>
+              <a:cxn ang="0">
+                <a:pos x="connsiteX128" y="connsiteY128"/>
+              </a:cxn>
+              <a:cxn ang="0">
+                <a:pos x="connsiteX129" y="connsiteY129"/>
+              </a:cxn>
+              <a:cxn ang="0">
+                <a:pos x="connsiteX130" y="connsiteY130"/>
+              </a:cxn>
+              <a:cxn ang="0">
+                <a:pos x="connsiteX131" y="connsiteY131"/>
+              </a:cxn>
+              <a:cxn ang="0">
+                <a:pos x="connsiteX132" y="connsiteY132"/>
+              </a:cxn>
+              <a:cxn ang="0">
+                <a:pos x="connsiteX133" y="connsiteY133"/>
+              </a:cxn>
+              <a:cxn ang="0">
+                <a:pos x="connsiteX134" y="connsiteY134"/>
+              </a:cxn>
+              <a:cxn ang="0">
+                <a:pos x="connsiteX135" y="connsiteY135"/>
+              </a:cxn>
+              <a:cxn ang="0">
+                <a:pos x="connsiteX136" y="connsiteY136"/>
+              </a:cxn>
+              <a:cxn ang="0">
+                <a:pos x="connsiteX137" y="connsiteY137"/>
+              </a:cxn>
+              <a:cxn ang="0">
+                <a:pos x="connsiteX138" y="connsiteY138"/>
+              </a:cxn>
+              <a:cxn ang="0">
+                <a:pos x="connsiteX139" y="connsiteY139"/>
+              </a:cxn>
+              <a:cxn ang="0">
+                <a:pos x="connsiteX140" y="connsiteY140"/>
+              </a:cxn>
+              <a:cxn ang="0">
+                <a:pos x="connsiteX141" y="connsiteY141"/>
+              </a:cxn>
+              <a:cxn ang="0">
+                <a:pos x="connsiteX142" y="connsiteY142"/>
+              </a:cxn>
+              <a:cxn ang="0">
+                <a:pos x="connsiteX143" y="connsiteY143"/>
+              </a:cxn>
+              <a:cxn ang="0">
+                <a:pos x="connsiteX144" y="connsiteY144"/>
+              </a:cxn>
+              <a:cxn ang="0">
+                <a:pos x="connsiteX145" y="connsiteY145"/>
+              </a:cxn>
+              <a:cxn ang="0">
+                <a:pos x="connsiteX146" y="connsiteY146"/>
+              </a:cxn>
+              <a:cxn ang="0">
+                <a:pos x="connsiteX147" y="connsiteY147"/>
+              </a:cxn>
+              <a:cxn ang="0">
+                <a:pos x="connsiteX148" y="connsiteY148"/>
+              </a:cxn>
+              <a:cxn ang="0">
+                <a:pos x="connsiteX149" y="connsiteY149"/>
+              </a:cxn>
+              <a:cxn ang="0">
+                <a:pos x="connsiteX150" y="connsiteY150"/>
+              </a:cxn>
+              <a:cxn ang="0">
+                <a:pos x="connsiteX151" y="connsiteY151"/>
+              </a:cxn>
+              <a:cxn ang="0">
+                <a:pos x="connsiteX152" y="connsiteY152"/>
+              </a:cxn>
+              <a:cxn ang="0">
+                <a:pos x="connsiteX153" y="connsiteY153"/>
+              </a:cxn>
+              <a:cxn ang="0">
+                <a:pos x="connsiteX154" y="connsiteY154"/>
+              </a:cxn>
+              <a:cxn ang="0">
+                <a:pos x="connsiteX155" y="connsiteY155"/>
+              </a:cxn>
+              <a:cxn ang="0">
+                <a:pos x="connsiteX156" y="connsiteY156"/>
+              </a:cxn>
+              <a:cxn ang="0">
+                <a:pos x="connsiteX157" y="connsiteY157"/>
+              </a:cxn>
+              <a:cxn ang="0">
+                <a:pos x="connsiteX158" y="connsiteY158"/>
+              </a:cxn>
+              <a:cxn ang="0">
+                <a:pos x="connsiteX159" y="connsiteY159"/>
+              </a:cxn>
+              <a:cxn ang="0">
+                <a:pos x="connsiteX160" y="connsiteY160"/>
+              </a:cxn>
+              <a:cxn ang="0">
+                <a:pos x="connsiteX161" y="connsiteY161"/>
+              </a:cxn>
+              <a:cxn ang="0">
+                <a:pos x="connsiteX162" y="connsiteY162"/>
+              </a:cxn>
+              <a:cxn ang="0">
+                <a:pos x="connsiteX163" y="connsiteY163"/>
+              </a:cxn>
+              <a:cxn ang="0">
+                <a:pos x="connsiteX164" y="connsiteY164"/>
+              </a:cxn>
+              <a:cxn ang="0">
+                <a:pos x="connsiteX165" y="connsiteY165"/>
+              </a:cxn>
+              <a:cxn ang="0">
+                <a:pos x="connsiteX166" y="connsiteY166"/>
+              </a:cxn>
+              <a:cxn ang="0">
+                <a:pos x="connsiteX167" y="connsiteY167"/>
+              </a:cxn>
+              <a:cxn ang="0">
+                <a:pos x="connsiteX168" y="connsiteY168"/>
+              </a:cxn>
+              <a:cxn ang="0">
+                <a:pos x="connsiteX169" y="connsiteY169"/>
+              </a:cxn>
+              <a:cxn ang="0">
+                <a:pos x="connsiteX170" y="connsiteY170"/>
+              </a:cxn>
+              <a:cxn ang="0">
+                <a:pos x="connsiteX171" y="connsiteY171"/>
+              </a:cxn>
+              <a:cxn ang="0">
+                <a:pos x="connsiteX172" y="connsiteY172"/>
+              </a:cxn>
+              <a:cxn ang="0">
+                <a:pos x="connsiteX173" y="connsiteY173"/>
+              </a:cxn>
+              <a:cxn ang="0">
+                <a:pos x="connsiteX174" y="connsiteY174"/>
+              </a:cxn>
+              <a:cxn ang="0">
+                <a:pos x="connsiteX175" y="connsiteY175"/>
+              </a:cxn>
+              <a:cxn ang="0">
+                <a:pos x="connsiteX176" y="connsiteY176"/>
+              </a:cxn>
+              <a:cxn ang="0">
+                <a:pos x="connsiteX177" y="connsiteY177"/>
+              </a:cxn>
+              <a:cxn ang="0">
+                <a:pos x="connsiteX178" y="connsiteY178"/>
+              </a:cxn>
+              <a:cxn ang="0">
+                <a:pos x="connsiteX179" y="connsiteY179"/>
+              </a:cxn>
+              <a:cxn ang="0">
+                <a:pos x="connsiteX180" y="connsiteY180"/>
+              </a:cxn>
+              <a:cxn ang="0">
+                <a:pos x="connsiteX181" y="connsiteY181"/>
+              </a:cxn>
+              <a:cxn ang="0">
+                <a:pos x="connsiteX182" y="connsiteY182"/>
+              </a:cxn>
+              <a:cxn ang="0">
+                <a:pos x="connsiteX183" y="connsiteY183"/>
+              </a:cxn>
+              <a:cxn ang="0">
+                <a:pos x="connsiteX184" y="connsiteY184"/>
+              </a:cxn>
+              <a:cxn ang="0">
+                <a:pos x="connsiteX185" y="connsiteY185"/>
+              </a:cxn>
+              <a:cxn ang="0">
+                <a:pos x="connsiteX186" y="connsiteY186"/>
+              </a:cxn>
+              <a:cxn ang="0">
+                <a:pos x="connsiteX187" y="connsiteY187"/>
+              </a:cxn>
+              <a:cxn ang="0">
+                <a:pos x="connsiteX188" y="connsiteY188"/>
+              </a:cxn>
+              <a:cxn ang="0">
+                <a:pos x="connsiteX189" y="connsiteY189"/>
+              </a:cxn>
+              <a:cxn ang="0">
+                <a:pos x="connsiteX190" y="connsiteY190"/>
+              </a:cxn>
+              <a:cxn ang="0">
+                <a:pos x="connsiteX191" y="connsiteY191"/>
+              </a:cxn>
+              <a:cxn ang="0">
+                <a:pos x="connsiteX192" y="connsiteY192"/>
+              </a:cxn>
+              <a:cxn ang="0">
+                <a:pos x="connsiteX193" y="connsiteY193"/>
+              </a:cxn>
+              <a:cxn ang="0">
+                <a:pos x="connsiteX194" y="connsiteY194"/>
+              </a:cxn>
             </a:cxnLst>
             <a:rect l="l" t="t" r="r" b="b"/>
             <a:pathLst>
-              <a:path w="91138" h="91138">
+              <a:path w="10680562" h="1605023">
                 <a:moveTo>
-                  <a:pt x="91138" y="45569"/>
+                  <a:pt x="3617689" y="0"/>
                 </a:moveTo>
+                <a:lnTo>
+                  <a:pt x="3635901" y="7738"/>
+                </a:lnTo>
                 <a:cubicBezTo>
-                  <a:pt x="91138" y="70736"/>
-                  <a:pt x="70736" y="91138"/>
-                  <a:pt x="45569" y="91138"/>
+                  <a:pt x="3636815" y="-13593"/>
+                  <a:pt x="3674070" y="21953"/>
+                  <a:pt x="3690891" y="7049"/>
                 </a:cubicBezTo>
                 <a:cubicBezTo>
-                  <a:pt x="20402" y="91138"/>
-                  <a:pt x="0" y="70736"/>
-                  <a:pt x="0" y="45569"/>
+                  <a:pt x="3723615" y="8082"/>
+                  <a:pt x="3780877" y="7675"/>
+                  <a:pt x="3832247" y="13937"/>
                 </a:cubicBezTo>
                 <a:cubicBezTo>
-                  <a:pt x="0" y="20402"/>
-                  <a:pt x="20402" y="0"/>
-                  <a:pt x="45569" y="0"/>
+                  <a:pt x="3878761" y="52737"/>
+                  <a:pt x="3960967" y="15082"/>
+                  <a:pt x="3999111" y="44624"/>
                 </a:cubicBezTo>
                 <a:cubicBezTo>
-                  <a:pt x="70736" y="0"/>
-                  <a:pt x="91138" y="20402"/>
-                  <a:pt x="91138" y="45569"/>
+                  <a:pt x="4011661" y="48427"/>
+                  <a:pt x="4023440" y="49464"/>
+                  <a:pt x="4034676" y="48775"/>
+                </a:cubicBezTo>
+                <a:lnTo>
+                  <a:pt x="4065394" y="42879"/>
+                </a:lnTo>
+                <a:lnTo>
+                  <a:pt x="4072648" y="33262"/>
+                </a:lnTo>
+                <a:lnTo>
+                  <a:pt x="4092232" y="34026"/>
+                </a:lnTo>
+                <a:lnTo>
+                  <a:pt x="4097470" y="32252"/>
+                </a:lnTo>
+                <a:cubicBezTo>
+                  <a:pt x="4107476" y="28819"/>
+                  <a:pt x="4117405" y="25741"/>
+                  <a:pt x="4127488" y="24056"/>
+                </a:cubicBezTo>
+                <a:cubicBezTo>
+                  <a:pt x="4122379" y="69900"/>
+                  <a:pt x="4212421" y="17287"/>
+                  <a:pt x="4190803" y="55685"/>
+                </a:cubicBezTo>
+                <a:cubicBezTo>
+                  <a:pt x="4245322" y="54405"/>
+                  <a:pt x="4210442" y="91290"/>
+                  <a:pt x="4269333" y="54186"/>
+                </a:cubicBezTo>
+                <a:cubicBezTo>
+                  <a:pt x="4360007" y="84494"/>
+                  <a:pt x="4405441" y="66275"/>
+                  <a:pt x="4481486" y="116915"/>
+                </a:cubicBezTo>
+                <a:cubicBezTo>
+                  <a:pt x="4469366" y="96298"/>
+                  <a:pt x="4624978" y="141388"/>
+                  <a:pt x="4651418" y="150071"/>
+                </a:cubicBezTo>
+                <a:lnTo>
+                  <a:pt x="4863575" y="175458"/>
+                </a:lnTo>
+                <a:cubicBezTo>
+                  <a:pt x="4867452" y="182323"/>
+                  <a:pt x="5007365" y="209256"/>
+                  <a:pt x="5013635" y="213928"/>
+                </a:cubicBezTo>
+                <a:lnTo>
+                  <a:pt x="5203044" y="228946"/>
+                </a:lnTo>
+                <a:lnTo>
+                  <a:pt x="5207070" y="235105"/>
+                </a:lnTo>
+                <a:lnTo>
+                  <a:pt x="5224253" y="240320"/>
+                </a:lnTo>
+                <a:lnTo>
+                  <a:pt x="5256736" y="254811"/>
+                </a:lnTo>
+                <a:lnTo>
+                  <a:pt x="5264095" y="253567"/>
+                </a:lnTo>
+                <a:lnTo>
+                  <a:pt x="5315084" y="269264"/>
+                </a:lnTo>
+                <a:lnTo>
+                  <a:pt x="5316393" y="267603"/>
+                </a:lnTo>
+                <a:cubicBezTo>
+                  <a:pt x="5320500" y="264235"/>
+                  <a:pt x="5325719" y="262424"/>
+                  <a:pt x="5333427" y="263823"/>
+                </a:cubicBezTo>
+                <a:cubicBezTo>
+                  <a:pt x="5330520" y="234164"/>
+                  <a:pt x="5341605" y="254143"/>
+                  <a:pt x="5364589" y="260882"/>
+                </a:cubicBezTo>
+                <a:cubicBezTo>
+                  <a:pt x="5365199" y="216323"/>
+                  <a:pt x="5425089" y="252089"/>
+                  <a:pt x="5443973" y="230866"/>
+                </a:cubicBezTo>
+                <a:cubicBezTo>
+                  <a:pt x="5460840" y="236821"/>
+                  <a:pt x="5478689" y="242307"/>
+                  <a:pt x="5497201" y="247023"/>
+                </a:cubicBezTo>
+                <a:lnTo>
+                  <a:pt x="5508269" y="249256"/>
+                </a:lnTo>
+                <a:lnTo>
+                  <a:pt x="5508636" y="248880"/>
+                </a:lnTo>
+                <a:cubicBezTo>
+                  <a:pt x="5511356" y="248469"/>
+                  <a:pt x="5515116" y="248867"/>
+                  <a:pt x="5520606" y="250400"/>
+                </a:cubicBezTo>
+                <a:lnTo>
+                  <a:pt x="5528451" y="253330"/>
+                </a:lnTo>
+                <a:lnTo>
+                  <a:pt x="5549923" y="257662"/>
+                </a:lnTo>
+                <a:lnTo>
+                  <a:pt x="5558295" y="256364"/>
+                </a:lnTo>
+                <a:lnTo>
+                  <a:pt x="5664799" y="278924"/>
+                </a:lnTo>
+                <a:lnTo>
+                  <a:pt x="5796160" y="307979"/>
+                </a:lnTo>
+                <a:lnTo>
+                  <a:pt x="5897647" y="339431"/>
+                </a:lnTo>
+                <a:cubicBezTo>
+                  <a:pt x="5894921" y="322560"/>
+                  <a:pt x="5962532" y="357207"/>
+                  <a:pt x="5978838" y="367970"/>
+                </a:cubicBezTo>
+                <a:cubicBezTo>
+                  <a:pt x="6035145" y="375765"/>
+                  <a:pt x="6006578" y="380813"/>
+                  <a:pt x="6050367" y="386341"/>
+                </a:cubicBezTo>
+                <a:cubicBezTo>
+                  <a:pt x="6051161" y="391932"/>
+                  <a:pt x="6137489" y="380709"/>
+                  <a:pt x="6140609" y="385135"/>
+                </a:cubicBezTo>
+                <a:cubicBezTo>
+                  <a:pt x="6205928" y="424013"/>
+                  <a:pt x="6248816" y="452185"/>
+                  <a:pt x="6302950" y="448183"/>
+                </a:cubicBezTo>
+                <a:lnTo>
+                  <a:pt x="6308533" y="448551"/>
+                </a:lnTo>
+                <a:lnTo>
+                  <a:pt x="6340278" y="468555"/>
+                </a:lnTo>
+                <a:lnTo>
+                  <a:pt x="6341685" y="467587"/>
+                </a:lnTo>
+                <a:cubicBezTo>
+                  <a:pt x="6345560" y="465876"/>
+                  <a:pt x="6349786" y="465470"/>
+                  <a:pt x="6354862" y="467794"/>
+                </a:cubicBezTo>
+                <a:cubicBezTo>
+                  <a:pt x="6361260" y="446013"/>
+                  <a:pt x="6363438" y="462250"/>
+                  <a:pt x="6377840" y="471024"/>
+                </a:cubicBezTo>
+                <a:cubicBezTo>
+                  <a:pt x="6390990" y="439154"/>
+                  <a:pt x="6423334" y="475084"/>
+                  <a:pt x="6442804" y="463091"/>
+                </a:cubicBezTo>
+                <a:cubicBezTo>
+                  <a:pt x="6453090" y="470255"/>
+                  <a:pt x="6464204" y="477252"/>
+                  <a:pt x="6476009" y="483807"/>
+                </a:cubicBezTo>
+                <a:lnTo>
+                  <a:pt x="6483237" y="487308"/>
+                </a:lnTo>
+                <a:lnTo>
+                  <a:pt x="6483605" y="487102"/>
+                </a:lnTo>
+                <a:cubicBezTo>
+                  <a:pt x="6485654" y="487272"/>
+                  <a:pt x="6488212" y="488201"/>
+                  <a:pt x="6491673" y="490243"/>
+                </a:cubicBezTo>
+                <a:lnTo>
+                  <a:pt x="6496411" y="493689"/>
+                </a:lnTo>
+                <a:lnTo>
+                  <a:pt x="6510429" y="500479"/>
+                </a:lnTo>
+                <a:lnTo>
+                  <a:pt x="6516750" y="500983"/>
+                </a:lnTo>
+                <a:cubicBezTo>
+                  <a:pt x="6541864" y="496675"/>
+                  <a:pt x="6554866" y="452619"/>
+                  <a:pt x="6580199" y="483318"/>
+                </a:cubicBezTo>
+                <a:cubicBezTo>
+                  <a:pt x="6622601" y="489571"/>
+                  <a:pt x="6654587" y="470617"/>
+                  <a:pt x="6690237" y="493051"/>
+                </a:cubicBezTo>
+                <a:cubicBezTo>
+                  <a:pt x="6729957" y="498806"/>
+                  <a:pt x="6766252" y="494451"/>
+                  <a:pt x="6798356" y="506748"/>
+                </a:cubicBezTo>
+                <a:cubicBezTo>
+                  <a:pt x="6813529" y="501270"/>
+                  <a:pt x="6826992" y="500232"/>
+                  <a:pt x="6837102" y="513677"/>
+                </a:cubicBezTo>
+                <a:cubicBezTo>
+                  <a:pt x="6874837" y="515764"/>
+                  <a:pt x="6887115" y="500833"/>
+                  <a:pt x="6907934" y="517339"/>
+                </a:cubicBezTo>
+                <a:cubicBezTo>
+                  <a:pt x="6934086" y="494196"/>
+                  <a:pt x="6933260" y="504492"/>
+                  <a:pt x="6941474" y="513632"/>
+                </a:cubicBezTo>
+                <a:lnTo>
+                  <a:pt x="6942754" y="514394"/>
+                </a:lnTo>
+                <a:lnTo>
+                  <a:pt x="6946363" y="511066"/>
+                </a:lnTo>
+                <a:lnTo>
+                  <a:pt x="6952592" y="510252"/>
+                </a:lnTo>
+                <a:lnTo>
+                  <a:pt x="6968398" y="513946"/>
+                </a:lnTo>
+                <a:lnTo>
+                  <a:pt x="6974142" y="516310"/>
+                </a:lnTo>
+                <a:cubicBezTo>
+                  <a:pt x="6978173" y="517574"/>
+                  <a:pt x="6980948" y="517948"/>
+                  <a:pt x="6982971" y="517694"/>
+                </a:cubicBezTo>
+                <a:lnTo>
+                  <a:pt x="6983252" y="517416"/>
+                </a:lnTo>
+                <a:lnTo>
+                  <a:pt x="6991400" y="519321"/>
+                </a:lnTo>
+                <a:cubicBezTo>
+                  <a:pt x="7005004" y="523242"/>
+                  <a:pt x="7018100" y="527732"/>
+                  <a:pt x="7030460" y="532556"/>
+                </a:cubicBezTo>
+                <a:cubicBezTo>
+                  <a:pt x="7044917" y="516932"/>
+                  <a:pt x="7088472" y="545083"/>
+                  <a:pt x="7089916" y="511503"/>
+                </a:cubicBezTo>
+                <a:cubicBezTo>
+                  <a:pt x="7106785" y="517039"/>
+                  <a:pt x="7114554" y="532321"/>
+                  <a:pt x="7113059" y="509904"/>
+                </a:cubicBezTo>
+                <a:cubicBezTo>
+                  <a:pt x="7118735" y="511110"/>
+                  <a:pt x="7122641" y="509850"/>
+                  <a:pt x="7125755" y="507393"/>
+                </a:cubicBezTo>
+                <a:lnTo>
+                  <a:pt x="7126765" y="506166"/>
+                </a:lnTo>
+                <a:lnTo>
+                  <a:pt x="7164175" y="519011"/>
+                </a:lnTo>
+                <a:lnTo>
+                  <a:pt x="7169654" y="518219"/>
+                </a:lnTo>
+                <a:lnTo>
+                  <a:pt x="7193386" y="529788"/>
+                </a:lnTo>
+                <a:lnTo>
+                  <a:pt x="7205997" y="534060"/>
+                </a:lnTo>
+                <a:lnTo>
+                  <a:pt x="7208842" y="538783"/>
+                </a:lnTo>
+                <a:cubicBezTo>
+                  <a:pt x="7212314" y="541931"/>
+                  <a:pt x="7217803" y="543928"/>
+                  <a:pt x="7227817" y="543304"/>
+                </a:cubicBezTo>
+                <a:lnTo>
+                  <a:pt x="7230267" y="542497"/>
+                </a:lnTo>
+                <a:lnTo>
+                  <a:pt x="7244913" y="551160"/>
+                </a:lnTo>
+                <a:cubicBezTo>
+                  <a:pt x="7249453" y="554807"/>
+                  <a:pt x="7253253" y="559130"/>
+                  <a:pt x="7255970" y="564383"/>
+                </a:cubicBezTo>
+                <a:cubicBezTo>
+                  <a:pt x="7315146" y="548103"/>
+                  <a:pt x="7361553" y="579076"/>
+                  <a:pt x="7421156" y="584155"/>
+                </a:cubicBezTo>
+                <a:cubicBezTo>
+                  <a:pt x="7465612" y="613750"/>
+                  <a:pt x="7546249" y="613142"/>
+                  <a:pt x="7553166" y="653085"/>
+                </a:cubicBezTo>
+                <a:cubicBezTo>
+                  <a:pt x="7562552" y="609214"/>
+                  <a:pt x="7673998" y="724531"/>
+                  <a:pt x="7643092" y="662482"/>
+                </a:cubicBezTo>
+                <a:lnTo>
+                  <a:pt x="7896429" y="689054"/>
+                </a:lnTo>
+                <a:cubicBezTo>
+                  <a:pt x="7940867" y="662251"/>
+                  <a:pt x="7914217" y="689365"/>
+                  <a:pt x="7954620" y="689481"/>
+                </a:cubicBezTo>
+                <a:cubicBezTo>
+                  <a:pt x="7937756" y="718000"/>
+                  <a:pt x="8005608" y="680123"/>
+                  <a:pt x="8000803" y="714583"/>
+                </a:cubicBezTo>
+                <a:cubicBezTo>
+                  <a:pt x="8008309" y="713512"/>
+                  <a:pt x="8015731" y="711389"/>
+                  <a:pt x="8023216" y="709000"/>
+                </a:cubicBezTo>
+                <a:lnTo>
+                  <a:pt x="8027136" y="707765"/>
+                </a:lnTo>
+                <a:lnTo>
+                  <a:pt x="8041622" y="708731"/>
+                </a:lnTo>
+                <a:lnTo>
+                  <a:pt x="8047209" y="701624"/>
+                </a:lnTo>
+                <a:lnTo>
+                  <a:pt x="8070088" y="697789"/>
+                </a:lnTo>
+                <a:cubicBezTo>
+                  <a:pt x="8078424" y="697492"/>
+                  <a:pt x="8087123" y="698508"/>
+                  <a:pt x="8096332" y="701624"/>
+                </a:cubicBezTo>
+                <a:cubicBezTo>
+                  <a:pt x="8123926" y="724651"/>
+                  <a:pt x="8185640" y="697894"/>
+                  <a:pt x="8219225" y="728069"/>
+                </a:cubicBezTo>
+                <a:cubicBezTo>
+                  <a:pt x="8232644" y="736562"/>
+                  <a:pt x="8280723" y="746936"/>
+                  <a:pt x="8293793" y="739200"/>
+                </a:cubicBezTo>
+                <a:cubicBezTo>
+                  <a:pt x="8304636" y="739365"/>
+                  <a:pt x="8314843" y="745516"/>
+                  <a:pt x="8323753" y="736063"/>
+                </a:cubicBezTo>
+                <a:cubicBezTo>
+                  <a:pt x="8336542" y="725164"/>
+                  <a:pt x="8363344" y="752699"/>
+                  <a:pt x="8364496" y="736635"/>
+                </a:cubicBezTo>
+                <a:cubicBezTo>
+                  <a:pt x="8383724" y="755702"/>
+                  <a:pt x="8414211" y="733717"/>
+                  <a:pt x="8437662" y="731942"/>
+                </a:cubicBezTo>
+                <a:cubicBezTo>
+                  <a:pt x="8451685" y="749699"/>
+                  <a:pt x="8487061" y="728469"/>
+                  <a:pt x="8533764" y="735554"/>
+                </a:cubicBezTo>
+                <a:cubicBezTo>
+                  <a:pt x="8548878" y="755832"/>
+                  <a:pt x="8565301" y="740114"/>
+                  <a:pt x="8596769" y="769632"/>
+                </a:cubicBezTo>
+                <a:cubicBezTo>
+                  <a:pt x="8598880" y="767829"/>
+                  <a:pt x="8601326" y="766261"/>
+                  <a:pt x="8604035" y="764982"/>
+                </a:cubicBezTo>
+                <a:cubicBezTo>
+                  <a:pt x="8619777" y="757551"/>
+                  <a:pt x="8640772" y="761213"/>
+                  <a:pt x="8650929" y="773164"/>
+                </a:cubicBezTo>
+                <a:cubicBezTo>
+                  <a:pt x="8702615" y="814545"/>
+                  <a:pt x="8757170" y="823762"/>
+                  <a:pt x="8806497" y="839707"/>
+                </a:cubicBezTo>
+                <a:cubicBezTo>
+                  <a:pt x="8863157" y="854381"/>
+                  <a:pt x="8833749" y="812347"/>
+                  <a:pt x="8898377" y="854651"/>
+                </a:cubicBezTo>
+                <a:cubicBezTo>
+                  <a:pt x="8909161" y="844048"/>
+                  <a:pt x="8918437" y="845186"/>
+                  <a:pt x="8932389" y="853846"/>
+                </a:cubicBezTo>
+                <a:cubicBezTo>
+                  <a:pt x="8960146" y="860074"/>
+                  <a:pt x="8965550" y="829338"/>
+                  <a:pt x="8989288" y="852877"/>
+                </a:cubicBezTo>
+                <a:cubicBezTo>
+                  <a:pt x="8988278" y="835633"/>
+                  <a:pt x="9043995" y="856467"/>
+                  <a:pt x="9035275" y="837110"/>
+                </a:cubicBezTo>
+                <a:cubicBezTo>
+                  <a:pt x="9060165" y="838647"/>
+                  <a:pt x="9108456" y="858499"/>
+                  <a:pt x="9138626" y="862106"/>
+                </a:cubicBezTo>
+                <a:cubicBezTo>
+                  <a:pt x="9165080" y="876547"/>
+                  <a:pt x="9174888" y="860404"/>
+                  <a:pt x="9216298" y="858754"/>
+                </a:cubicBezTo>
+                <a:cubicBezTo>
+                  <a:pt x="9230418" y="871192"/>
+                  <a:pt x="9244774" y="868822"/>
+                  <a:pt x="9259941" y="861843"/>
+                </a:cubicBezTo>
+                <a:cubicBezTo>
+                  <a:pt x="9297647" y="870955"/>
+                  <a:pt x="9335980" y="863006"/>
+                  <a:pt x="9380407" y="864825"/>
+                </a:cubicBezTo>
+                <a:cubicBezTo>
+                  <a:pt x="9424338" y="883720"/>
+                  <a:pt x="9443322" y="899138"/>
+                  <a:pt x="9490772" y="901190"/>
+                </a:cubicBezTo>
+                <a:cubicBezTo>
+                  <a:pt x="9530410" y="933396"/>
+                  <a:pt x="9546422" y="928548"/>
+                  <a:pt x="9584982" y="935980"/>
+                </a:cubicBezTo>
+                <a:cubicBezTo>
+                  <a:pt x="9629819" y="954269"/>
+                  <a:pt x="9718219" y="986435"/>
+                  <a:pt x="9759797" y="1010923"/>
+                </a:cubicBezTo>
+                <a:cubicBezTo>
+                  <a:pt x="9801376" y="1035410"/>
+                  <a:pt x="9804503" y="1066293"/>
+                  <a:pt x="9834455" y="1082908"/>
+                </a:cubicBezTo>
+                <a:cubicBezTo>
+                  <a:pt x="9864406" y="1099522"/>
+                  <a:pt x="9891608" y="1087791"/>
+                  <a:pt x="9939504" y="1110614"/>
+                </a:cubicBezTo>
+                <a:cubicBezTo>
+                  <a:pt x="9978150" y="1098522"/>
+                  <a:pt x="10034187" y="1166580"/>
+                  <a:pt x="10077001" y="1160906"/>
+                </a:cubicBezTo>
+                <a:cubicBezTo>
+                  <a:pt x="10084861" y="1190721"/>
+                  <a:pt x="10164307" y="1234884"/>
+                  <a:pt x="10178431" y="1244920"/>
+                </a:cubicBezTo>
+                <a:cubicBezTo>
+                  <a:pt x="10210316" y="1215779"/>
+                  <a:pt x="10222273" y="1306394"/>
+                  <a:pt x="10248658" y="1309335"/>
+                </a:cubicBezTo>
+                <a:lnTo>
+                  <a:pt x="10414709" y="1388645"/>
+                </a:lnTo>
+                <a:cubicBezTo>
+                  <a:pt x="10473963" y="1440373"/>
+                  <a:pt x="10538857" y="1454568"/>
+                  <a:pt x="10592469" y="1543828"/>
+                </a:cubicBezTo>
+                <a:cubicBezTo>
+                  <a:pt x="10651538" y="1531501"/>
+                  <a:pt x="10660082" y="1567462"/>
+                  <a:pt x="10674941" y="1597388"/>
+                </a:cubicBezTo>
+                <a:lnTo>
+                  <a:pt x="10680562" y="1605023"/>
+                </a:lnTo>
+                <a:lnTo>
+                  <a:pt x="0" y="1605023"/>
+                </a:lnTo>
+                <a:lnTo>
+                  <a:pt x="0" y="415048"/>
+                </a:lnTo>
+                <a:lnTo>
+                  <a:pt x="9656" y="416044"/>
+                </a:lnTo>
+                <a:cubicBezTo>
+                  <a:pt x="66794" y="420549"/>
+                  <a:pt x="142962" y="423374"/>
+                  <a:pt x="179196" y="423071"/>
+                </a:cubicBezTo>
+                <a:cubicBezTo>
+                  <a:pt x="202136" y="418172"/>
+                  <a:pt x="228694" y="392385"/>
+                  <a:pt x="250912" y="408617"/>
+                </a:cubicBezTo>
+                <a:cubicBezTo>
+                  <a:pt x="249389" y="392611"/>
+                  <a:pt x="280512" y="416185"/>
+                  <a:pt x="291375" y="403710"/>
+                </a:cubicBezTo>
+                <a:cubicBezTo>
+                  <a:pt x="298635" y="393187"/>
+                  <a:pt x="309770" y="397885"/>
+                  <a:pt x="320542" y="396592"/>
+                </a:cubicBezTo>
+                <a:cubicBezTo>
+                  <a:pt x="359051" y="397166"/>
+                  <a:pt x="484339" y="405354"/>
+                  <a:pt x="522426" y="407158"/>
+                </a:cubicBezTo>
+                <a:cubicBezTo>
+                  <a:pt x="532069" y="408997"/>
+                  <a:pt x="540856" y="408831"/>
+                  <a:pt x="549068" y="407418"/>
+                </a:cubicBezTo>
+                <a:lnTo>
+                  <a:pt x="571100" y="400562"/>
+                </a:lnTo>
+                <a:lnTo>
+                  <a:pt x="575457" y="392801"/>
+                </a:lnTo>
+                <a:lnTo>
+                  <a:pt x="589968" y="391807"/>
+                </a:lnTo>
+                <a:lnTo>
+                  <a:pt x="593649" y="390062"/>
+                </a:lnTo>
+                <a:cubicBezTo>
+                  <a:pt x="600667" y="386700"/>
+                  <a:pt x="607669" y="383607"/>
+                  <a:pt x="614928" y="381544"/>
+                </a:cubicBezTo>
+                <a:cubicBezTo>
+                  <a:pt x="636416" y="381988"/>
+                  <a:pt x="667253" y="387671"/>
+                  <a:pt x="722580" y="392722"/>
+                </a:cubicBezTo>
+                <a:cubicBezTo>
+                  <a:pt x="792539" y="408114"/>
+                  <a:pt x="885615" y="380106"/>
+                  <a:pt x="946884" y="411854"/>
+                </a:cubicBezTo>
+                <a:cubicBezTo>
+                  <a:pt x="1028270" y="418469"/>
+                  <a:pt x="1139077" y="429433"/>
+                  <a:pt x="1210905" y="432414"/>
+                </a:cubicBezTo>
+                <a:cubicBezTo>
+                  <a:pt x="1270803" y="429423"/>
+                  <a:pt x="1321921" y="453757"/>
+                  <a:pt x="1377854" y="429745"/>
+                </a:cubicBezTo>
+                <a:cubicBezTo>
+                  <a:pt x="1381419" y="434564"/>
+                  <a:pt x="1385901" y="438319"/>
+                  <a:pt x="1391004" y="441307"/>
+                </a:cubicBezTo>
+                <a:lnTo>
+                  <a:pt x="1406953" y="447889"/>
+                </a:lnTo>
+                <a:lnTo>
+                  <a:pt x="1409246" y="446765"/>
+                </a:lnTo>
+                <a:cubicBezTo>
+                  <a:pt x="1419066" y="444804"/>
+                  <a:pt x="1424836" y="446037"/>
+                  <a:pt x="1428800" y="448677"/>
+                </a:cubicBezTo>
+                <a:lnTo>
+                  <a:pt x="1432402" y="452956"/>
+                </a:lnTo>
+                <a:lnTo>
+                  <a:pt x="1606578" y="430870"/>
+                </a:lnTo>
+                <a:cubicBezTo>
+                  <a:pt x="1619625" y="433971"/>
+                  <a:pt x="1633347" y="436643"/>
+                  <a:pt x="1647476" y="438687"/>
+                </a:cubicBezTo>
+                <a:lnTo>
+                  <a:pt x="1655866" y="439472"/>
+                </a:lnTo>
+                <a:lnTo>
+                  <a:pt x="1656096" y="439162"/>
+                </a:lnTo>
+                <a:cubicBezTo>
+                  <a:pt x="1658061" y="438636"/>
+                  <a:pt x="1666503" y="411823"/>
+                  <a:pt x="1670708" y="412530"/>
+                </a:cubicBezTo>
+                <a:lnTo>
+                  <a:pt x="1737953" y="399496"/>
+                </a:lnTo>
+                <a:lnTo>
+                  <a:pt x="1848192" y="376032"/>
+                </a:lnTo>
+                <a:cubicBezTo>
+                  <a:pt x="1887458" y="368088"/>
+                  <a:pt x="1918458" y="352092"/>
+                  <a:pt x="1954077" y="352621"/>
+                </a:cubicBezTo>
+                <a:cubicBezTo>
+                  <a:pt x="1965180" y="342609"/>
+                  <a:pt x="1976973" y="337201"/>
+                  <a:pt x="1993047" y="346068"/>
+                </a:cubicBezTo>
+                <a:cubicBezTo>
+                  <a:pt x="2028636" y="335449"/>
+                  <a:pt x="2032293" y="317806"/>
+                  <a:pt x="2059719" y="325903"/>
+                </a:cubicBezTo>
+                <a:cubicBezTo>
+                  <a:pt x="2071905" y="296194"/>
+                  <a:pt x="2076373" y="305826"/>
+                  <a:pt x="2088528" y="311409"/>
+                </a:cubicBezTo>
+                <a:lnTo>
+                  <a:pt x="2090087" y="311676"/>
+                </a:lnTo>
+                <a:lnTo>
+                  <a:pt x="2091700" y="307455"/>
+                </a:lnTo>
+                <a:lnTo>
+                  <a:pt x="2096989" y="304649"/>
+                </a:lnTo>
+                <a:lnTo>
+                  <a:pt x="2113325" y="302764"/>
+                </a:lnTo>
+                <a:lnTo>
+                  <a:pt x="2119780" y="303007"/>
+                </a:lnTo>
+                <a:cubicBezTo>
+                  <a:pt x="2124111" y="302819"/>
+                  <a:pt x="2126840" y="302239"/>
+                  <a:pt x="2128562" y="301336"/>
+                </a:cubicBezTo>
+                <a:cubicBezTo>
+                  <a:pt x="2128600" y="301221"/>
+                  <a:pt x="2128640" y="301107"/>
+                  <a:pt x="2128679" y="300991"/>
+                </a:cubicBezTo>
+                <a:lnTo>
+                  <a:pt x="2179558" y="299095"/>
+                </a:lnTo>
+                <a:cubicBezTo>
+                  <a:pt x="2184857" y="280099"/>
+                  <a:pt x="2238998" y="291238"/>
+                  <a:pt x="2223277" y="260239"/>
+                </a:cubicBezTo>
+                <a:cubicBezTo>
+                  <a:pt x="2241523" y="259676"/>
+                  <a:pt x="2256386" y="270988"/>
+                  <a:pt x="2243644" y="251110"/>
+                </a:cubicBezTo>
+                <a:cubicBezTo>
+                  <a:pt x="2249448" y="250324"/>
+                  <a:pt x="2252382" y="247882"/>
+                  <a:pt x="2253986" y="244616"/>
+                </a:cubicBezTo>
+                <a:lnTo>
+                  <a:pt x="2254285" y="243167"/>
+                </a:lnTo>
+                <a:lnTo>
+                  <a:pt x="2295037" y="242433"/>
+                </a:lnTo>
+                <a:lnTo>
+                  <a:pt x="2299648" y="239896"/>
+                </a:lnTo>
+                <a:lnTo>
+                  <a:pt x="2327237" y="242539"/>
+                </a:lnTo>
+                <a:lnTo>
+                  <a:pt x="2340943" y="242239"/>
+                </a:lnTo>
+                <a:lnTo>
+                  <a:pt x="2345943" y="245589"/>
+                </a:lnTo>
+                <a:cubicBezTo>
+                  <a:pt x="2350718" y="247299"/>
+                  <a:pt x="2356754" y="247292"/>
+                  <a:pt x="2365602" y="243403"/>
+                </a:cubicBezTo>
+                <a:lnTo>
+                  <a:pt x="2367433" y="241858"/>
+                </a:lnTo>
+                <a:lnTo>
+                  <a:pt x="2385231" y="244873"/>
+                </a:lnTo>
+                <a:cubicBezTo>
+                  <a:pt x="2391237" y="246682"/>
+                  <a:pt x="2396907" y="249351"/>
+                  <a:pt x="2402059" y="253223"/>
+                </a:cubicBezTo>
+                <a:cubicBezTo>
+                  <a:pt x="2457690" y="251623"/>
+                  <a:pt x="2639813" y="242704"/>
+                  <a:pt x="2719020" y="235271"/>
+                </a:cubicBezTo>
+                <a:cubicBezTo>
+                  <a:pt x="2762954" y="229515"/>
+                  <a:pt x="2821915" y="222156"/>
+                  <a:pt x="2877308" y="208630"/>
+                </a:cubicBezTo>
+                <a:cubicBezTo>
+                  <a:pt x="2947949" y="226393"/>
+                  <a:pt x="2978035" y="153757"/>
+                  <a:pt x="3051375" y="154110"/>
+                </a:cubicBezTo>
+                <a:cubicBezTo>
+                  <a:pt x="3078434" y="115011"/>
+                  <a:pt x="3067807" y="148493"/>
+                  <a:pt x="3104837" y="135199"/>
+                </a:cubicBezTo>
+                <a:cubicBezTo>
+                  <a:pt x="3103880" y="166713"/>
+                  <a:pt x="3146743" y="109780"/>
+                  <a:pt x="3159836" y="142694"/>
+                </a:cubicBezTo>
+                <a:cubicBezTo>
+                  <a:pt x="3166160" y="139232"/>
+                  <a:pt x="3171875" y="134841"/>
+                  <a:pt x="3177510" y="130186"/>
+                </a:cubicBezTo>
+                <a:lnTo>
+                  <a:pt x="3180470" y="127764"/>
+                </a:lnTo>
+                <a:lnTo>
+                  <a:pt x="3194216" y="123837"/>
+                </a:lnTo>
+                <a:lnTo>
+                  <a:pt x="3214710" y="104451"/>
+                </a:lnTo>
+                <a:cubicBezTo>
+                  <a:pt x="3222186" y="101416"/>
+                  <a:pt x="3230663" y="99454"/>
+                  <a:pt x="3240671" y="99232"/>
+                </a:cubicBezTo>
+                <a:cubicBezTo>
+                  <a:pt x="3277606" y="111009"/>
+                  <a:pt x="3320498" y="66221"/>
+                  <a:pt x="3366544" y="82506"/>
+                </a:cubicBezTo>
+                <a:cubicBezTo>
+                  <a:pt x="3383134" y="85775"/>
+                  <a:pt x="3432393" y="79256"/>
+                  <a:pt x="3440424" y="67891"/>
+                </a:cubicBezTo>
+                <a:cubicBezTo>
+                  <a:pt x="3450432" y="64444"/>
+                  <a:pt x="3462892" y="66649"/>
+                  <a:pt x="3466248" y="55103"/>
+                </a:cubicBezTo>
+                <a:cubicBezTo>
+                  <a:pt x="3472418" y="40954"/>
+                  <a:pt x="3510917" y="57092"/>
+                  <a:pt x="3503820" y="42110"/>
+                </a:cubicBezTo>
+                <a:lnTo>
+                  <a:pt x="3568389" y="13576"/>
+                </a:lnTo>
+                <a:cubicBezTo>
+                  <a:pt x="3579310" y="19318"/>
+                  <a:pt x="3590168" y="14433"/>
+                  <a:pt x="3604089" y="6980"/>
                 </a:cubicBezTo>
                 <a:close/>
               </a:path>
             </a:pathLst>
           </a:custGeom>
           <a:solidFill>
-            <a:schemeClr val="accent1"/>
+            <a:srgbClr val="82766A">
+              <a:alpha val="15000"/>
+            </a:srgbClr>
           </a:solidFill>
-          <a:ln w="422" cap="flat">
+          <a:ln w="12700" cap="flat" cmpd="sng" algn="ctr">
             <a:noFill/>
             <a:prstDash val="solid"/>
-            <a:miter/>
+            <a:miter lim="800000"/>
           </a:ln>
+          <a:effectLst/>
         </p:spPr>
+        <p:style>
+          <a:lnRef idx="2">
+            <a:schemeClr val="accent1">
+              <a:shade val="50000"/>
+            </a:schemeClr>
+          </a:lnRef>
+          <a:fillRef idx="1">
+            <a:schemeClr val="accent1"/>
+          </a:fillRef>
+          <a:effectRef idx="0">
+            <a:schemeClr val="accent1"/>
+          </a:effectRef>
+          <a:fontRef idx="minor">
+            <a:schemeClr val="lt1"/>
+          </a:fontRef>
+        </p:style>
         <p:txBody>
           <a:bodyPr rtlCol="0" anchor="ctr"/>
           <a:lstStyle/>
           <a:p>
+            <a:pPr algn="ctr"/>
             <a:endParaRPr lang="en-US"/>
           </a:p>
         </p:txBody>
       </p:sp>
+      <p:pic>
+        <p:nvPicPr>
+          <p:cNvPr id="7" name="Graphic 6" descr="Open Hand with Plant">
+            <a:extLst>
+              <a:ext uri="{FF2B5EF4-FFF2-40B4-BE49-F238E27FC236}">
+                <a16:creationId xmlns:a16="http://schemas.microsoft.com/office/drawing/2014/main" id="{6CB8E202-BE19-465D-927B-9BDF03692B8E}"/>
+              </a:ext>
+            </a:extLst>
+          </p:cNvPr>
+          <p:cNvPicPr>
+            <a:picLocks noChangeAspect="1"/>
+          </p:cNvPicPr>
+          <p:nvPr/>
+        </p:nvPicPr>
+        <p:blipFill>
+          <a:blip r:embed="rId2">
+            <a:extLst>
+              <a:ext uri="{28A0092B-C50C-407E-A947-70E740481C1C}">
+                <a14:useLocalDpi xmlns:a14="http://schemas.microsoft.com/office/drawing/2010/main" val="0"/>
+              </a:ext>
+              <a:ext uri="{96DAC541-7B7A-43D3-8B79-37D633B846F1}">
+                <asvg:svgBlip xmlns:asvg="http://schemas.microsoft.com/office/drawing/2016/SVG/main" r:embed="rId3"/>
+              </a:ext>
+            </a:extLst>
+          </a:blip>
+          <a:stretch>
+            <a:fillRect/>
+          </a:stretch>
+        </p:blipFill>
+        <p:spPr>
+          <a:xfrm>
+            <a:off x="8093123" y="1662682"/>
+            <a:ext cx="3521122" cy="3521122"/>
+          </a:xfrm>
+          <a:prstGeom prst="rect">
+            <a:avLst/>
+          </a:prstGeom>
+        </p:spPr>
+      </p:pic>
     </p:spTree>
     <p:extLst>
       <p:ext uri="{BB962C8B-B14F-4D97-AF65-F5344CB8AC3E}">

</xml_diff>